<commit_message>
feat(7_mini_batch): update ppt and code
</commit_message>
<xml_diff>
--- a/lessons/7_mini_batch/ppt/使用小批量随机梯度下降.pptx
+++ b/lessons/7_mini_batch/ppt/使用小批量随机梯度下降.pptx
@@ -7012,7 +7012,7 @@
                             </p:stCondLst>
                             <p:childTnLst>
                               <p:par>
-                                <p:cTn id="5" presetID="1" presetClass="entr" presetSubtype="0" fill="hold" grpId="0" nodeType="clickEffect">
+                                <p:cTn id="5" presetID="1" presetClass="entr" presetSubtype="0" fill="hold" nodeType="clickEffect">
                                   <p:stCondLst>
                                     <p:cond delay="0"/>
                                   </p:stCondLst>
@@ -7025,7 +7025,11 @@
                                           </p:stCondLst>
                                         </p:cTn>
                                         <p:tgtEl>
-                                          <p:spTgt spid="6"/>
+                                          <p:spTgt spid="6">
+                                            <p:txEl>
+                                              <p:pRg st="0" end="0"/>
+                                            </p:txEl>
+                                          </p:spTgt>
                                         </p:tgtEl>
                                         <p:attrNameLst>
                                           <p:attrName>style.visibility</p:attrName>
@@ -7089,6 +7093,198 @@
                       </p:childTnLst>
                     </p:cTn>
                   </p:par>
+                  <p:par>
+                    <p:cTn id="11" fill="hold">
+                      <p:stCondLst>
+                        <p:cond delay="indefinite"/>
+                      </p:stCondLst>
+                      <p:childTnLst>
+                        <p:par>
+                          <p:cTn id="12" fill="hold">
+                            <p:stCondLst>
+                              <p:cond delay="0"/>
+                            </p:stCondLst>
+                            <p:childTnLst>
+                              <p:par>
+                                <p:cTn id="13" presetID="1" presetClass="entr" presetSubtype="0" fill="hold" nodeType="clickEffect">
+                                  <p:stCondLst>
+                                    <p:cond delay="0"/>
+                                  </p:stCondLst>
+                                  <p:childTnLst>
+                                    <p:set>
+                                      <p:cBhvr>
+                                        <p:cTn id="14" dur="1" fill="hold">
+                                          <p:stCondLst>
+                                            <p:cond delay="0"/>
+                                          </p:stCondLst>
+                                        </p:cTn>
+                                        <p:tgtEl>
+                                          <p:spTgt spid="6">
+                                            <p:txEl>
+                                              <p:pRg st="1" end="1"/>
+                                            </p:txEl>
+                                          </p:spTgt>
+                                        </p:tgtEl>
+                                        <p:attrNameLst>
+                                          <p:attrName>style.visibility</p:attrName>
+                                        </p:attrNameLst>
+                                      </p:cBhvr>
+                                      <p:to>
+                                        <p:strVal val="visible"/>
+                                      </p:to>
+                                    </p:set>
+                                  </p:childTnLst>
+                                </p:cTn>
+                              </p:par>
+                            </p:childTnLst>
+                          </p:cTn>
+                        </p:par>
+                      </p:childTnLst>
+                    </p:cTn>
+                  </p:par>
+                  <p:par>
+                    <p:cTn id="15" fill="hold">
+                      <p:stCondLst>
+                        <p:cond delay="indefinite"/>
+                      </p:stCondLst>
+                      <p:childTnLst>
+                        <p:par>
+                          <p:cTn id="16" fill="hold">
+                            <p:stCondLst>
+                              <p:cond delay="0"/>
+                            </p:stCondLst>
+                            <p:childTnLst>
+                              <p:par>
+                                <p:cTn id="17" presetID="1" presetClass="entr" presetSubtype="0" fill="hold" nodeType="clickEffect">
+                                  <p:stCondLst>
+                                    <p:cond delay="0"/>
+                                  </p:stCondLst>
+                                  <p:childTnLst>
+                                    <p:set>
+                                      <p:cBhvr>
+                                        <p:cTn id="18" dur="1" fill="hold">
+                                          <p:stCondLst>
+                                            <p:cond delay="0"/>
+                                          </p:stCondLst>
+                                        </p:cTn>
+                                        <p:tgtEl>
+                                          <p:spTgt spid="6">
+                                            <p:txEl>
+                                              <p:pRg st="2" end="2"/>
+                                            </p:txEl>
+                                          </p:spTgt>
+                                        </p:tgtEl>
+                                        <p:attrNameLst>
+                                          <p:attrName>style.visibility</p:attrName>
+                                        </p:attrNameLst>
+                                      </p:cBhvr>
+                                      <p:to>
+                                        <p:strVal val="visible"/>
+                                      </p:to>
+                                    </p:set>
+                                  </p:childTnLst>
+                                </p:cTn>
+                              </p:par>
+                            </p:childTnLst>
+                          </p:cTn>
+                        </p:par>
+                      </p:childTnLst>
+                    </p:cTn>
+                  </p:par>
+                  <p:par>
+                    <p:cTn id="19" fill="hold">
+                      <p:stCondLst>
+                        <p:cond delay="indefinite"/>
+                      </p:stCondLst>
+                      <p:childTnLst>
+                        <p:par>
+                          <p:cTn id="20" fill="hold">
+                            <p:stCondLst>
+                              <p:cond delay="0"/>
+                            </p:stCondLst>
+                            <p:childTnLst>
+                              <p:par>
+                                <p:cTn id="21" presetID="1" presetClass="entr" presetSubtype="0" fill="hold" nodeType="clickEffect">
+                                  <p:stCondLst>
+                                    <p:cond delay="0"/>
+                                  </p:stCondLst>
+                                  <p:childTnLst>
+                                    <p:set>
+                                      <p:cBhvr>
+                                        <p:cTn id="22" dur="1" fill="hold">
+                                          <p:stCondLst>
+                                            <p:cond delay="0"/>
+                                          </p:stCondLst>
+                                        </p:cTn>
+                                        <p:tgtEl>
+                                          <p:spTgt spid="1026"/>
+                                        </p:tgtEl>
+                                        <p:attrNameLst>
+                                          <p:attrName>style.visibility</p:attrName>
+                                        </p:attrNameLst>
+                                      </p:cBhvr>
+                                      <p:to>
+                                        <p:strVal val="visible"/>
+                                      </p:to>
+                                    </p:set>
+                                  </p:childTnLst>
+                                </p:cTn>
+                              </p:par>
+                            </p:childTnLst>
+                          </p:cTn>
+                        </p:par>
+                      </p:childTnLst>
+                    </p:cTn>
+                  </p:par>
+                  <p:par>
+                    <p:cTn id="23" fill="hold">
+                      <p:stCondLst>
+                        <p:cond delay="indefinite"/>
+                      </p:stCondLst>
+                      <p:childTnLst>
+                        <p:par>
+                          <p:cTn id="24" fill="hold">
+                            <p:stCondLst>
+                              <p:cond delay="0"/>
+                            </p:stCondLst>
+                            <p:childTnLst>
+                              <p:par>
+                                <p:cTn id="25" presetID="1" presetClass="entr" presetSubtype="0" fill="hold" nodeType="clickEffect">
+                                  <p:stCondLst>
+                                    <p:cond delay="0"/>
+                                  </p:stCondLst>
+                                  <p:childTnLst>
+                                    <p:set>
+                                      <p:cBhvr>
+                                        <p:cTn id="26" dur="1" fill="hold">
+                                          <p:stCondLst>
+                                            <p:cond delay="0"/>
+                                          </p:stCondLst>
+                                        </p:cTn>
+                                        <p:tgtEl>
+                                          <p:spTgt spid="6">
+                                            <p:txEl>
+                                              <p:pRg st="3" end="3"/>
+                                            </p:txEl>
+                                          </p:spTgt>
+                                        </p:tgtEl>
+                                        <p:attrNameLst>
+                                          <p:attrName>style.visibility</p:attrName>
+                                        </p:attrNameLst>
+                                      </p:cBhvr>
+                                      <p:to>
+                                        <p:strVal val="visible"/>
+                                      </p:to>
+                                    </p:set>
+                                  </p:childTnLst>
+                                </p:cTn>
+                              </p:par>
+                            </p:childTnLst>
+                          </p:cTn>
+                        </p:par>
+                      </p:childTnLst>
+                    </p:cTn>
+                  </p:par>
                 </p:childTnLst>
               </p:cTn>
               <p:prevCondLst>
@@ -7110,9 +7306,6 @@
         </p:cTn>
       </p:par>
     </p:tnLst>
-    <p:bldLst>
-      <p:bldP spid="6" grpId="0"/>
-    </p:bldLst>
   </p:timing>
 </p:sld>
 </file>
@@ -7417,7 +7610,7 @@
             </a:pPr>
             <a:r>
               <a:rPr lang="zh-CN" altLang="en-US" dirty="0"/>
-              <a:t>梯度下降的公式是什么？</a:t>
+              <a:t>对于随机梯度下降，梯度等于什么？</a:t>
             </a:r>
             <a:endParaRPr lang="en-US" altLang="zh-CN" dirty="0"/>
           </a:p>
@@ -7529,15 +7722,57 @@
               <a:buChar char="•"/>
             </a:pPr>
             <a:endParaRPr lang="zh-CN" altLang="en-US" dirty="0"/>
+          </a:p>
+        </p:txBody>
+      </p:sp>
+      <p:sp>
+        <p:nvSpPr>
+          <p:cNvPr id="8" name="文本框 7">
+            <a:extLst>
+              <a:ext uri="{FF2B5EF4-FFF2-40B4-BE49-F238E27FC236}">
+                <a16:creationId xmlns:a16="http://schemas.microsoft.com/office/drawing/2014/main" id="{063630C6-1C42-26A5-3EF7-5E515D3A85FC}"/>
+              </a:ext>
+            </a:extLst>
+          </p:cNvPr>
+          <p:cNvSpPr txBox="1"/>
+          <p:nvPr/>
+        </p:nvSpPr>
+        <p:spPr>
+          <a:xfrm>
+            <a:off x="6410849" y="4129873"/>
+            <a:ext cx="5647174" cy="1200329"/>
+          </a:xfrm>
+          <a:prstGeom prst="rect">
+            <a:avLst/>
+          </a:prstGeom>
+          <a:noFill/>
+        </p:spPr>
+        <p:txBody>
+          <a:bodyPr wrap="square" rtlCol="0">
+            <a:spAutoFit/>
+          </a:bodyPr>
+          <a:lstStyle/>
+          <a:p>
+            <a:r>
+              <a:rPr kumimoji="1" lang="zh-CN" altLang="en-US" dirty="0"/>
+              <a:t>一样。</a:t>
+            </a:r>
+            <a:endParaRPr kumimoji="1" lang="en-US" altLang="zh-CN" dirty="0"/>
+          </a:p>
+          <a:p>
+            <a:r>
+              <a:rPr kumimoji="1" lang="zh-CN" altLang="en-US" dirty="0"/>
+              <a:t>因为期望约等于平均值，而小批量随机梯度下降的梯度是在计算平均值，平均值的期望约等于原值的期望，所以期望不变</a:t>
+            </a:r>
           </a:p>
         </p:txBody>
       </p:sp>
       <p:pic>
         <p:nvPicPr>
-          <p:cNvPr id="4" name="图片 3">
+          <p:cNvPr id="5" name="图片 4">
             <a:extLst>
               <a:ext uri="{FF2B5EF4-FFF2-40B4-BE49-F238E27FC236}">
-                <a16:creationId xmlns:a16="http://schemas.microsoft.com/office/drawing/2014/main" id="{BEDF8318-CD28-79FC-619E-988F965E76FD}"/>
+                <a16:creationId xmlns:a16="http://schemas.microsoft.com/office/drawing/2014/main" id="{46A448E0-BB89-F14C-F32A-7E049F9D0788}"/>
               </a:ext>
             </a:extLst>
           </p:cNvPr>
@@ -7560,8 +7795,8 @@
         </p:blipFill>
         <p:spPr>
           <a:xfrm>
-            <a:off x="8335247" y="1645896"/>
-            <a:ext cx="2260600" cy="876300"/>
+            <a:off x="8746191" y="2794502"/>
+            <a:ext cx="1638300" cy="901700"/>
           </a:xfrm>
           <a:prstGeom prst="rect">
             <a:avLst/>
@@ -7570,10 +7805,10 @@
       </p:pic>
       <p:pic>
         <p:nvPicPr>
-          <p:cNvPr id="7" name="图片 6">
+          <p:cNvPr id="10" name="图片 9">
             <a:extLst>
               <a:ext uri="{FF2B5EF4-FFF2-40B4-BE49-F238E27FC236}">
-                <a16:creationId xmlns:a16="http://schemas.microsoft.com/office/drawing/2014/main" id="{78066E8A-9077-8B2F-BD09-2696C63352EC}"/>
+                <a16:creationId xmlns:a16="http://schemas.microsoft.com/office/drawing/2014/main" id="{255A857B-81BD-3F4A-FD3A-42C4E66CDED4}"/>
               </a:ext>
             </a:extLst>
           </p:cNvPr>
@@ -7596,62 +7831,20 @@
         </p:blipFill>
         <p:spPr>
           <a:xfrm>
-            <a:off x="8244812" y="3011281"/>
-            <a:ext cx="1955800" cy="952500"/>
+            <a:off x="8903820" y="1778635"/>
+            <a:ext cx="1054100" cy="673100"/>
           </a:xfrm>
           <a:prstGeom prst="rect">
             <a:avLst/>
           </a:prstGeom>
         </p:spPr>
       </p:pic>
-      <p:sp>
-        <p:nvSpPr>
-          <p:cNvPr id="8" name="文本框 7">
+      <p:pic>
+        <p:nvPicPr>
+          <p:cNvPr id="12" name="图片 11">
             <a:extLst>
               <a:ext uri="{FF2B5EF4-FFF2-40B4-BE49-F238E27FC236}">
-                <a16:creationId xmlns:a16="http://schemas.microsoft.com/office/drawing/2014/main" id="{063630C6-1C42-26A5-3EF7-5E515D3A85FC}"/>
-              </a:ext>
-            </a:extLst>
-          </p:cNvPr>
-          <p:cNvSpPr txBox="1"/>
-          <p:nvPr/>
-        </p:nvSpPr>
-        <p:spPr>
-          <a:xfrm>
-            <a:off x="6410849" y="4129873"/>
-            <a:ext cx="5647174" cy="923330"/>
-          </a:xfrm>
-          <a:prstGeom prst="rect">
-            <a:avLst/>
-          </a:prstGeom>
-          <a:noFill/>
-        </p:spPr>
-        <p:txBody>
-          <a:bodyPr wrap="square" rtlCol="0">
-            <a:spAutoFit/>
-          </a:bodyPr>
-          <a:lstStyle/>
-          <a:p>
-            <a:r>
-              <a:rPr kumimoji="1" lang="zh-CN" altLang="en-US" dirty="0"/>
-              <a:t>一样。</a:t>
-            </a:r>
-            <a:endParaRPr kumimoji="1" lang="en-US" altLang="zh-CN" dirty="0"/>
-          </a:p>
-          <a:p>
-            <a:r>
-              <a:rPr kumimoji="1" lang="zh-CN" altLang="en-US" dirty="0"/>
-              <a:t>因为期望约等于平均值，而小批量随机梯度下降的梯度就是在计算平均值，所以没有改变期望</a:t>
-            </a:r>
-          </a:p>
-        </p:txBody>
-      </p:sp>
-      <p:pic>
-        <p:nvPicPr>
-          <p:cNvPr id="13" name="图片 12">
-            <a:extLst>
-              <a:ext uri="{FF2B5EF4-FFF2-40B4-BE49-F238E27FC236}">
-                <a16:creationId xmlns:a16="http://schemas.microsoft.com/office/drawing/2014/main" id="{96A20319-034C-5445-B0F6-48E94D8828EF}"/>
+                <a16:creationId xmlns:a16="http://schemas.microsoft.com/office/drawing/2014/main" id="{EF19BDD6-056C-8054-2477-3524B72102CE}"/>
               </a:ext>
             </a:extLst>
           </p:cNvPr>
@@ -7674,8 +7867,8 @@
         </p:blipFill>
         <p:spPr>
           <a:xfrm>
-            <a:off x="2903973" y="5053203"/>
-            <a:ext cx="3048000" cy="1054100"/>
+            <a:off x="2848162" y="5229714"/>
+            <a:ext cx="2730500" cy="977900"/>
           </a:xfrm>
           <a:prstGeom prst="rect">
             <a:avLst/>
@@ -7716,7 +7909,7 @@
                             </p:stCondLst>
                             <p:childTnLst>
                               <p:par>
-                                <p:cTn id="5" presetID="1" presetClass="entr" presetSubtype="0" fill="hold" grpId="0" nodeType="clickEffect">
+                                <p:cTn id="5" presetID="1" presetClass="entr" presetSubtype="0" fill="hold" nodeType="clickEffect">
                                   <p:stCondLst>
                                     <p:cond delay="0"/>
                                   </p:stCondLst>
@@ -7729,7 +7922,387 @@
                                           </p:stCondLst>
                                         </p:cTn>
                                         <p:tgtEl>
-                                          <p:spTgt spid="6"/>
+                                          <p:spTgt spid="6">
+                                            <p:txEl>
+                                              <p:pRg st="0" end="0"/>
+                                            </p:txEl>
+                                          </p:spTgt>
+                                        </p:tgtEl>
+                                        <p:attrNameLst>
+                                          <p:attrName>style.visibility</p:attrName>
+                                        </p:attrNameLst>
+                                      </p:cBhvr>
+                                      <p:to>
+                                        <p:strVal val="visible"/>
+                                      </p:to>
+                                    </p:set>
+                                  </p:childTnLst>
+                                </p:cTn>
+                              </p:par>
+                            </p:childTnLst>
+                          </p:cTn>
+                        </p:par>
+                      </p:childTnLst>
+                    </p:cTn>
+                  </p:par>
+                  <p:par>
+                    <p:cTn id="7" fill="hold">
+                      <p:stCondLst>
+                        <p:cond delay="indefinite"/>
+                      </p:stCondLst>
+                      <p:childTnLst>
+                        <p:par>
+                          <p:cTn id="8" fill="hold">
+                            <p:stCondLst>
+                              <p:cond delay="0"/>
+                            </p:stCondLst>
+                            <p:childTnLst>
+                              <p:par>
+                                <p:cTn id="9" presetID="1" presetClass="entr" presetSubtype="0" fill="hold" nodeType="clickEffect">
+                                  <p:stCondLst>
+                                    <p:cond delay="0"/>
+                                  </p:stCondLst>
+                                  <p:childTnLst>
+                                    <p:set>
+                                      <p:cBhvr>
+                                        <p:cTn id="10" dur="1" fill="hold">
+                                          <p:stCondLst>
+                                            <p:cond delay="0"/>
+                                          </p:stCondLst>
+                                        </p:cTn>
+                                        <p:tgtEl>
+                                          <p:spTgt spid="6">
+                                            <p:txEl>
+                                              <p:pRg st="1" end="1"/>
+                                            </p:txEl>
+                                          </p:spTgt>
+                                        </p:tgtEl>
+                                        <p:attrNameLst>
+                                          <p:attrName>style.visibility</p:attrName>
+                                        </p:attrNameLst>
+                                      </p:cBhvr>
+                                      <p:to>
+                                        <p:strVal val="visible"/>
+                                      </p:to>
+                                    </p:set>
+                                  </p:childTnLst>
+                                </p:cTn>
+                              </p:par>
+                            </p:childTnLst>
+                          </p:cTn>
+                        </p:par>
+                      </p:childTnLst>
+                    </p:cTn>
+                  </p:par>
+                  <p:par>
+                    <p:cTn id="11" fill="hold">
+                      <p:stCondLst>
+                        <p:cond delay="indefinite"/>
+                      </p:stCondLst>
+                      <p:childTnLst>
+                        <p:par>
+                          <p:cTn id="12" fill="hold">
+                            <p:stCondLst>
+                              <p:cond delay="0"/>
+                            </p:stCondLst>
+                            <p:childTnLst>
+                              <p:par>
+                                <p:cTn id="13" presetID="1" presetClass="entr" presetSubtype="0" fill="hold" nodeType="clickEffect">
+                                  <p:stCondLst>
+                                    <p:cond delay="0"/>
+                                  </p:stCondLst>
+                                  <p:childTnLst>
+                                    <p:set>
+                                      <p:cBhvr>
+                                        <p:cTn id="14" dur="1" fill="hold">
+                                          <p:stCondLst>
+                                            <p:cond delay="0"/>
+                                          </p:stCondLst>
+                                        </p:cTn>
+                                        <p:tgtEl>
+                                          <p:spTgt spid="10"/>
+                                        </p:tgtEl>
+                                        <p:attrNameLst>
+                                          <p:attrName>style.visibility</p:attrName>
+                                        </p:attrNameLst>
+                                      </p:cBhvr>
+                                      <p:to>
+                                        <p:strVal val="visible"/>
+                                      </p:to>
+                                    </p:set>
+                                  </p:childTnLst>
+                                </p:cTn>
+                              </p:par>
+                            </p:childTnLst>
+                          </p:cTn>
+                        </p:par>
+                      </p:childTnLst>
+                    </p:cTn>
+                  </p:par>
+                  <p:par>
+                    <p:cTn id="15" fill="hold">
+                      <p:stCondLst>
+                        <p:cond delay="indefinite"/>
+                      </p:stCondLst>
+                      <p:childTnLst>
+                        <p:par>
+                          <p:cTn id="16" fill="hold">
+                            <p:stCondLst>
+                              <p:cond delay="0"/>
+                            </p:stCondLst>
+                            <p:childTnLst>
+                              <p:par>
+                                <p:cTn id="17" presetID="1" presetClass="entr" presetSubtype="0" fill="hold" nodeType="clickEffect">
+                                  <p:stCondLst>
+                                    <p:cond delay="0"/>
+                                  </p:stCondLst>
+                                  <p:childTnLst>
+                                    <p:set>
+                                      <p:cBhvr>
+                                        <p:cTn id="18" dur="1" fill="hold">
+                                          <p:stCondLst>
+                                            <p:cond delay="0"/>
+                                          </p:stCondLst>
+                                        </p:cTn>
+                                        <p:tgtEl>
+                                          <p:spTgt spid="6">
+                                            <p:txEl>
+                                              <p:pRg st="2" end="2"/>
+                                            </p:txEl>
+                                          </p:spTgt>
+                                        </p:tgtEl>
+                                        <p:attrNameLst>
+                                          <p:attrName>style.visibility</p:attrName>
+                                        </p:attrNameLst>
+                                      </p:cBhvr>
+                                      <p:to>
+                                        <p:strVal val="visible"/>
+                                      </p:to>
+                                    </p:set>
+                                  </p:childTnLst>
+                                </p:cTn>
+                              </p:par>
+                            </p:childTnLst>
+                          </p:cTn>
+                        </p:par>
+                      </p:childTnLst>
+                    </p:cTn>
+                  </p:par>
+                  <p:par>
+                    <p:cTn id="19" fill="hold">
+                      <p:stCondLst>
+                        <p:cond delay="indefinite"/>
+                      </p:stCondLst>
+                      <p:childTnLst>
+                        <p:par>
+                          <p:cTn id="20" fill="hold">
+                            <p:stCondLst>
+                              <p:cond delay="0"/>
+                            </p:stCondLst>
+                            <p:childTnLst>
+                              <p:par>
+                                <p:cTn id="21" presetID="1" presetClass="entr" presetSubtype="0" fill="hold" nodeType="clickEffect">
+                                  <p:stCondLst>
+                                    <p:cond delay="0"/>
+                                  </p:stCondLst>
+                                  <p:childTnLst>
+                                    <p:set>
+                                      <p:cBhvr>
+                                        <p:cTn id="22" dur="1" fill="hold">
+                                          <p:stCondLst>
+                                            <p:cond delay="0"/>
+                                          </p:stCondLst>
+                                        </p:cTn>
+                                        <p:tgtEl>
+                                          <p:spTgt spid="5"/>
+                                        </p:tgtEl>
+                                        <p:attrNameLst>
+                                          <p:attrName>style.visibility</p:attrName>
+                                        </p:attrNameLst>
+                                      </p:cBhvr>
+                                      <p:to>
+                                        <p:strVal val="visible"/>
+                                      </p:to>
+                                    </p:set>
+                                  </p:childTnLst>
+                                </p:cTn>
+                              </p:par>
+                            </p:childTnLst>
+                          </p:cTn>
+                        </p:par>
+                      </p:childTnLst>
+                    </p:cTn>
+                  </p:par>
+                  <p:par>
+                    <p:cTn id="23" fill="hold">
+                      <p:stCondLst>
+                        <p:cond delay="indefinite"/>
+                      </p:stCondLst>
+                      <p:childTnLst>
+                        <p:par>
+                          <p:cTn id="24" fill="hold">
+                            <p:stCondLst>
+                              <p:cond delay="0"/>
+                            </p:stCondLst>
+                            <p:childTnLst>
+                              <p:par>
+                                <p:cTn id="25" presetID="1" presetClass="entr" presetSubtype="0" fill="hold" nodeType="clickEffect">
+                                  <p:stCondLst>
+                                    <p:cond delay="0"/>
+                                  </p:stCondLst>
+                                  <p:childTnLst>
+                                    <p:set>
+                                      <p:cBhvr>
+                                        <p:cTn id="26" dur="1" fill="hold">
+                                          <p:stCondLst>
+                                            <p:cond delay="0"/>
+                                          </p:stCondLst>
+                                        </p:cTn>
+                                        <p:tgtEl>
+                                          <p:spTgt spid="6">
+                                            <p:txEl>
+                                              <p:pRg st="3" end="3"/>
+                                            </p:txEl>
+                                          </p:spTgt>
+                                        </p:tgtEl>
+                                        <p:attrNameLst>
+                                          <p:attrName>style.visibility</p:attrName>
+                                        </p:attrNameLst>
+                                      </p:cBhvr>
+                                      <p:to>
+                                        <p:strVal val="visible"/>
+                                      </p:to>
+                                    </p:set>
+                                  </p:childTnLst>
+                                </p:cTn>
+                              </p:par>
+                            </p:childTnLst>
+                          </p:cTn>
+                        </p:par>
+                      </p:childTnLst>
+                    </p:cTn>
+                  </p:par>
+                  <p:par>
+                    <p:cTn id="27" fill="hold">
+                      <p:stCondLst>
+                        <p:cond delay="indefinite"/>
+                      </p:stCondLst>
+                      <p:childTnLst>
+                        <p:par>
+                          <p:cTn id="28" fill="hold">
+                            <p:stCondLst>
+                              <p:cond delay="0"/>
+                            </p:stCondLst>
+                            <p:childTnLst>
+                              <p:par>
+                                <p:cTn id="29" presetID="1" presetClass="entr" presetSubtype="0" fill="hold" grpId="0" nodeType="clickEffect">
+                                  <p:stCondLst>
+                                    <p:cond delay="0"/>
+                                  </p:stCondLst>
+                                  <p:childTnLst>
+                                    <p:set>
+                                      <p:cBhvr>
+                                        <p:cTn id="30" dur="1" fill="hold">
+                                          <p:stCondLst>
+                                            <p:cond delay="0"/>
+                                          </p:stCondLst>
+                                        </p:cTn>
+                                        <p:tgtEl>
+                                          <p:spTgt spid="8"/>
+                                        </p:tgtEl>
+                                        <p:attrNameLst>
+                                          <p:attrName>style.visibility</p:attrName>
+                                        </p:attrNameLst>
+                                      </p:cBhvr>
+                                      <p:to>
+                                        <p:strVal val="visible"/>
+                                      </p:to>
+                                    </p:set>
+                                  </p:childTnLst>
+                                </p:cTn>
+                              </p:par>
+                            </p:childTnLst>
+                          </p:cTn>
+                        </p:par>
+                      </p:childTnLst>
+                    </p:cTn>
+                  </p:par>
+                  <p:par>
+                    <p:cTn id="31" fill="hold">
+                      <p:stCondLst>
+                        <p:cond delay="indefinite"/>
+                      </p:stCondLst>
+                      <p:childTnLst>
+                        <p:par>
+                          <p:cTn id="32" fill="hold">
+                            <p:stCondLst>
+                              <p:cond delay="0"/>
+                            </p:stCondLst>
+                            <p:childTnLst>
+                              <p:par>
+                                <p:cTn id="33" presetID="1" presetClass="entr" presetSubtype="0" fill="hold" nodeType="clickEffect">
+                                  <p:stCondLst>
+                                    <p:cond delay="0"/>
+                                  </p:stCondLst>
+                                  <p:childTnLst>
+                                    <p:set>
+                                      <p:cBhvr>
+                                        <p:cTn id="34" dur="1" fill="hold">
+                                          <p:stCondLst>
+                                            <p:cond delay="0"/>
+                                          </p:stCondLst>
+                                        </p:cTn>
+                                        <p:tgtEl>
+                                          <p:spTgt spid="6">
+                                            <p:txEl>
+                                              <p:pRg st="4" end="4"/>
+                                            </p:txEl>
+                                          </p:spTgt>
+                                        </p:tgtEl>
+                                        <p:attrNameLst>
+                                          <p:attrName>style.visibility</p:attrName>
+                                        </p:attrNameLst>
+                                      </p:cBhvr>
+                                      <p:to>
+                                        <p:strVal val="visible"/>
+                                      </p:to>
+                                    </p:set>
+                                  </p:childTnLst>
+                                </p:cTn>
+                              </p:par>
+                            </p:childTnLst>
+                          </p:cTn>
+                        </p:par>
+                      </p:childTnLst>
+                    </p:cTn>
+                  </p:par>
+                  <p:par>
+                    <p:cTn id="35" fill="hold">
+                      <p:stCondLst>
+                        <p:cond delay="indefinite"/>
+                      </p:stCondLst>
+                      <p:childTnLst>
+                        <p:par>
+                          <p:cTn id="36" fill="hold">
+                            <p:stCondLst>
+                              <p:cond delay="0"/>
+                            </p:stCondLst>
+                            <p:childTnLst>
+                              <p:par>
+                                <p:cTn id="37" presetID="1" presetClass="entr" presetSubtype="0" fill="hold" nodeType="clickEffect">
+                                  <p:stCondLst>
+                                    <p:cond delay="0"/>
+                                  </p:stCondLst>
+                                  <p:childTnLst>
+                                    <p:set>
+                                      <p:cBhvr>
+                                        <p:cTn id="38" dur="1" fill="hold">
+                                          <p:stCondLst>
+                                            <p:cond delay="0"/>
+                                          </p:stCondLst>
+                                        </p:cTn>
+                                        <p:tgtEl>
+                                          <p:spTgt spid="12"/>
                                         </p:tgtEl>
                                         <p:attrNameLst>
                                           <p:attrName>style.visibility</p:attrName>
@@ -7770,7 +8343,7 @@
       </p:par>
     </p:tnLst>
     <p:bldLst>
-      <p:bldP spid="6" grpId="0"/>
+      <p:bldP spid="8" grpId="0"/>
     </p:bldLst>
   </p:timing>
 </p:sld>
@@ -8066,7 +8639,7 @@
             </a:pPr>
             <a:r>
               <a:rPr lang="zh-CN" altLang="en-US" dirty="0"/>
-              <a:t>三种更新权重方法接近损失函数的极小值的情况是什么？</a:t>
+              <a:t>三种更新权重方法分别会如何接近损失函数的极小值？</a:t>
             </a:r>
             <a:endParaRPr lang="en-US" altLang="zh-CN" dirty="0"/>
           </a:p>
@@ -8218,53 +8791,6 @@
           <a:xfrm>
             <a:off x="6172155" y="3797309"/>
             <a:ext cx="4815883" cy="2419141"/>
-          </a:xfrm>
-          <a:prstGeom prst="rect">
-            <a:avLst/>
-          </a:prstGeom>
-          <a:noFill/>
-          <a:extLst>
-            <a:ext uri="{909E8E84-426E-40DD-AFC4-6F175D3DCCD1}">
-              <a14:hiddenFill xmlns:a14="http://schemas.microsoft.com/office/drawing/2010/main">
-                <a:solidFill>
-                  <a:srgbClr val="FFFFFF"/>
-                </a:solidFill>
-              </a14:hiddenFill>
-            </a:ext>
-          </a:extLst>
-        </p:spPr>
-      </p:pic>
-      <p:pic>
-        <p:nvPicPr>
-          <p:cNvPr id="5" name="Picture 2" descr="image">
-            <a:extLst>
-              <a:ext uri="{FF2B5EF4-FFF2-40B4-BE49-F238E27FC236}">
-                <a16:creationId xmlns:a16="http://schemas.microsoft.com/office/drawing/2014/main" id="{F0B2ACF7-D2EC-80CC-6F73-F74470A5D5C4}"/>
-              </a:ext>
-            </a:extLst>
-          </p:cNvPr>
-          <p:cNvPicPr>
-            <a:picLocks noChangeAspect="1" noChangeArrowheads="1"/>
-          </p:cNvPicPr>
-          <p:nvPr/>
-        </p:nvPicPr>
-        <p:blipFill>
-          <a:blip r:embed="rId4">
-            <a:extLst>
-              <a:ext uri="{28A0092B-C50C-407E-A947-70E740481C1C}">
-                <a14:useLocalDpi xmlns:a14="http://schemas.microsoft.com/office/drawing/2010/main" val="0"/>
-              </a:ext>
-            </a:extLst>
-          </a:blip>
-          <a:srcRect/>
-          <a:stretch>
-            <a:fillRect/>
-          </a:stretch>
-        </p:blipFill>
-        <p:spPr bwMode="auto">
-          <a:xfrm>
-            <a:off x="3013821" y="3716922"/>
-            <a:ext cx="2784077" cy="2837389"/>
           </a:xfrm>
           <a:prstGeom prst="rect">
             <a:avLst/>
@@ -8373,7 +8899,154 @@
                                           </p:stCondLst>
                                         </p:cTn>
                                         <p:tgtEl>
-                                          <p:spTgt spid="5"/>
+                                          <p:spTgt spid="6">
+                                            <p:txEl>
+                                              <p:pRg st="1" end="1"/>
+                                            </p:txEl>
+                                          </p:spTgt>
+                                        </p:tgtEl>
+                                        <p:attrNameLst>
+                                          <p:attrName>style.visibility</p:attrName>
+                                        </p:attrNameLst>
+                                      </p:cBhvr>
+                                      <p:to>
+                                        <p:strVal val="visible"/>
+                                      </p:to>
+                                    </p:set>
+                                  </p:childTnLst>
+                                </p:cTn>
+                              </p:par>
+                            </p:childTnLst>
+                          </p:cTn>
+                        </p:par>
+                      </p:childTnLst>
+                    </p:cTn>
+                  </p:par>
+                  <p:par>
+                    <p:cTn id="11" fill="hold">
+                      <p:stCondLst>
+                        <p:cond delay="indefinite"/>
+                      </p:stCondLst>
+                      <p:childTnLst>
+                        <p:par>
+                          <p:cTn id="12" fill="hold">
+                            <p:stCondLst>
+                              <p:cond delay="0"/>
+                            </p:stCondLst>
+                            <p:childTnLst>
+                              <p:par>
+                                <p:cTn id="13" presetID="1" presetClass="entr" presetSubtype="0" fill="hold" nodeType="clickEffect">
+                                  <p:stCondLst>
+                                    <p:cond delay="0"/>
+                                  </p:stCondLst>
+                                  <p:childTnLst>
+                                    <p:set>
+                                      <p:cBhvr>
+                                        <p:cTn id="14" dur="1" fill="hold">
+                                          <p:stCondLst>
+                                            <p:cond delay="0"/>
+                                          </p:stCondLst>
+                                        </p:cTn>
+                                        <p:tgtEl>
+                                          <p:spTgt spid="4"/>
+                                        </p:tgtEl>
+                                        <p:attrNameLst>
+                                          <p:attrName>style.visibility</p:attrName>
+                                        </p:attrNameLst>
+                                      </p:cBhvr>
+                                      <p:to>
+                                        <p:strVal val="visible"/>
+                                      </p:to>
+                                    </p:set>
+                                  </p:childTnLst>
+                                </p:cTn>
+                              </p:par>
+                            </p:childTnLst>
+                          </p:cTn>
+                        </p:par>
+                      </p:childTnLst>
+                    </p:cTn>
+                  </p:par>
+                  <p:par>
+                    <p:cTn id="15" fill="hold">
+                      <p:stCondLst>
+                        <p:cond delay="indefinite"/>
+                      </p:stCondLst>
+                      <p:childTnLst>
+                        <p:par>
+                          <p:cTn id="16" fill="hold">
+                            <p:stCondLst>
+                              <p:cond delay="0"/>
+                            </p:stCondLst>
+                            <p:childTnLst>
+                              <p:par>
+                                <p:cTn id="17" presetID="1" presetClass="entr" presetSubtype="0" fill="hold" nodeType="clickEffect">
+                                  <p:stCondLst>
+                                    <p:cond delay="0"/>
+                                  </p:stCondLst>
+                                  <p:childTnLst>
+                                    <p:set>
+                                      <p:cBhvr>
+                                        <p:cTn id="18" dur="1" fill="hold">
+                                          <p:stCondLst>
+                                            <p:cond delay="0"/>
+                                          </p:stCondLst>
+                                        </p:cTn>
+                                        <p:tgtEl>
+                                          <p:spTgt spid="6">
+                                            <p:txEl>
+                                              <p:pRg st="2" end="2"/>
+                                            </p:txEl>
+                                          </p:spTgt>
+                                        </p:tgtEl>
+                                        <p:attrNameLst>
+                                          <p:attrName>style.visibility</p:attrName>
+                                        </p:attrNameLst>
+                                      </p:cBhvr>
+                                      <p:to>
+                                        <p:strVal val="visible"/>
+                                      </p:to>
+                                    </p:set>
+                                  </p:childTnLst>
+                                </p:cTn>
+                              </p:par>
+                            </p:childTnLst>
+                          </p:cTn>
+                        </p:par>
+                      </p:childTnLst>
+                    </p:cTn>
+                  </p:par>
+                  <p:par>
+                    <p:cTn id="19" fill="hold">
+                      <p:stCondLst>
+                        <p:cond delay="indefinite"/>
+                      </p:stCondLst>
+                      <p:childTnLst>
+                        <p:par>
+                          <p:cTn id="20" fill="hold">
+                            <p:stCondLst>
+                              <p:cond delay="0"/>
+                            </p:stCondLst>
+                            <p:childTnLst>
+                              <p:par>
+                                <p:cTn id="21" presetID="1" presetClass="entr" presetSubtype="0" fill="hold" nodeType="clickEffect">
+                                  <p:stCondLst>
+                                    <p:cond delay="0"/>
+                                  </p:stCondLst>
+                                  <p:childTnLst>
+                                    <p:set>
+                                      <p:cBhvr>
+                                        <p:cTn id="22" dur="1" fill="hold">
+                                          <p:stCondLst>
+                                            <p:cond delay="0"/>
+                                          </p:stCondLst>
+                                        </p:cTn>
+                                        <p:tgtEl>
+                                          <p:spTgt spid="6">
+                                            <p:txEl>
+                                              <p:pRg st="3" end="3"/>
+                                            </p:txEl>
+                                          </p:spTgt>
                                         </p:tgtEl>
                                         <p:attrNameLst>
                                           <p:attrName>style.visibility</p:attrName>
@@ -8776,7 +9449,7 @@
             </a:pPr>
             <a:r>
               <a:rPr lang="zh-CN" altLang="en-US" dirty="0"/>
-              <a:t>请每个同学都运行代码，与梯度下降、随机梯度下降比较每轮</a:t>
+              <a:t>请每个同学都运行代码，分别与梯度下降、随机梯度下降比较每轮</a:t>
             </a:r>
             <a:r>
               <a:rPr lang="en-US" altLang="zh-CN" dirty="0"/>
@@ -8904,7 +9577,7 @@
                             </p:stCondLst>
                             <p:childTnLst>
                               <p:par>
-                                <p:cTn id="5" presetID="1" presetClass="entr" presetSubtype="0" fill="hold" grpId="0" nodeType="clickEffect">
+                                <p:cTn id="5" presetID="1" presetClass="entr" presetSubtype="0" fill="hold" nodeType="clickEffect">
                                   <p:stCondLst>
                                     <p:cond delay="0"/>
                                   </p:stCondLst>
@@ -8917,7 +9590,60 @@
                                           </p:stCondLst>
                                         </p:cTn>
                                         <p:tgtEl>
-                                          <p:spTgt spid="6"/>
+                                          <p:spTgt spid="6">
+                                            <p:txEl>
+                                              <p:pRg st="0" end="0"/>
+                                            </p:txEl>
+                                          </p:spTgt>
+                                        </p:tgtEl>
+                                        <p:attrNameLst>
+                                          <p:attrName>style.visibility</p:attrName>
+                                        </p:attrNameLst>
+                                      </p:cBhvr>
+                                      <p:to>
+                                        <p:strVal val="visible"/>
+                                      </p:to>
+                                    </p:set>
+                                  </p:childTnLst>
+                                </p:cTn>
+                              </p:par>
+                            </p:childTnLst>
+                          </p:cTn>
+                        </p:par>
+                      </p:childTnLst>
+                    </p:cTn>
+                  </p:par>
+                  <p:par>
+                    <p:cTn id="7" fill="hold">
+                      <p:stCondLst>
+                        <p:cond delay="indefinite"/>
+                      </p:stCondLst>
+                      <p:childTnLst>
+                        <p:par>
+                          <p:cTn id="8" fill="hold">
+                            <p:stCondLst>
+                              <p:cond delay="0"/>
+                            </p:stCondLst>
+                            <p:childTnLst>
+                              <p:par>
+                                <p:cTn id="9" presetID="1" presetClass="entr" presetSubtype="0" fill="hold" nodeType="clickEffect">
+                                  <p:stCondLst>
+                                    <p:cond delay="0"/>
+                                  </p:stCondLst>
+                                  <p:childTnLst>
+                                    <p:set>
+                                      <p:cBhvr>
+                                        <p:cTn id="10" dur="1" fill="hold">
+                                          <p:stCondLst>
+                                            <p:cond delay="0"/>
+                                          </p:stCondLst>
+                                        </p:cTn>
+                                        <p:tgtEl>
+                                          <p:spTgt spid="6">
+                                            <p:txEl>
+                                              <p:pRg st="1" end="1"/>
+                                            </p:txEl>
+                                          </p:spTgt>
                                         </p:tgtEl>
                                         <p:attrNameLst>
                                           <p:attrName>style.visibility</p:attrName>
@@ -8957,9 +9683,6 @@
         </p:cTn>
       </p:par>
     </p:tnLst>
-    <p:bldLst>
-      <p:bldP spid="6" grpId="0"/>
-    </p:bldLst>
   </p:timing>
 </p:sld>
 </file>
@@ -9830,9 +10553,58 @@
               <a:buChar char="•"/>
             </a:pPr>
             <a:r>
+              <a:rPr lang="zh-CN" altLang="en-US" dirty="0"/>
+              <a:t>为什么要学习本课</a:t>
+            </a:r>
+            <a:endParaRPr lang="en-US" altLang="zh-CN" dirty="0"/>
+          </a:p>
+          <a:p>
+            <a:pPr marL="285750" indent="-285750">
+              <a:buFont typeface="Arial" panose="020B0604020202020204" pitchFamily="34" charset="0"/>
+              <a:buChar char="•"/>
+            </a:pPr>
+            <a:r>
+              <a:rPr lang="zh-CN" altLang="en-US" dirty="0"/>
+              <a:t>主问题：如何充分利用</a:t>
+            </a:r>
+            <a:r>
               <a:rPr lang="en-US" altLang="zh-CN" dirty="0"/>
-              <a:t>TODO</a:t>
-            </a:r>
+              <a:t>CPU</a:t>
+            </a:r>
+            <a:r>
+              <a:rPr lang="zh-CN" altLang="en-US" dirty="0"/>
+              <a:t>缓存？</a:t>
+            </a:r>
+            <a:endParaRPr lang="en-US" altLang="zh-CN" dirty="0"/>
+          </a:p>
+          <a:p>
+            <a:pPr marL="285750" indent="-285750">
+              <a:buFont typeface="Arial" panose="020B0604020202020204" pitchFamily="34" charset="0"/>
+              <a:buChar char="•"/>
+            </a:pPr>
+            <a:r>
+              <a:rPr lang="zh-CN" altLang="en-US" dirty="0"/>
+              <a:t>主问题：如何更接近损失函数的极小值？</a:t>
+            </a:r>
+            <a:endParaRPr lang="en-US" altLang="zh-CN" dirty="0"/>
+          </a:p>
+          <a:p>
+            <a:pPr marL="285750" indent="-285750">
+              <a:buFont typeface="Arial" panose="020B0604020202020204" pitchFamily="34" charset="0"/>
+              <a:buChar char="•"/>
+            </a:pPr>
+            <a:r>
+              <a:rPr lang="zh-CN" altLang="en-US" dirty="0"/>
+              <a:t>任务：实现小批量随机梯度下降</a:t>
+            </a:r>
+            <a:br>
+              <a:rPr lang="en-US" altLang="zh-CN" dirty="0"/>
+            </a:br>
+            <a:r>
+              <a:rPr lang="zh-CN" altLang="en-US" dirty="0"/>
+              <a:t>	</a:t>
+            </a:r>
+            <a:endParaRPr lang="en-US" altLang="zh-CN" dirty="0"/>
           </a:p>
         </p:txBody>
       </p:sp>
@@ -9951,7 +10723,154 @@
                                         <p:tgtEl>
                                           <p:spTgt spid="2">
                                             <p:txEl>
-                                              <p:pRg st="1" end="1"/>
+                                              <p:charRg st="9" end="18"/>
+                                            </p:txEl>
+                                          </p:spTgt>
+                                        </p:tgtEl>
+                                        <p:attrNameLst>
+                                          <p:attrName>style.visibility</p:attrName>
+                                        </p:attrNameLst>
+                                      </p:cBhvr>
+                                      <p:to>
+                                        <p:strVal val="visible"/>
+                                      </p:to>
+                                    </p:set>
+                                  </p:childTnLst>
+                                </p:cTn>
+                              </p:par>
+                            </p:childTnLst>
+                          </p:cTn>
+                        </p:par>
+                      </p:childTnLst>
+                    </p:cTn>
+                  </p:par>
+                  <p:par>
+                    <p:cTn id="11" fill="hold">
+                      <p:stCondLst>
+                        <p:cond delay="indefinite"/>
+                      </p:stCondLst>
+                      <p:childTnLst>
+                        <p:par>
+                          <p:cTn id="12" fill="hold">
+                            <p:stCondLst>
+                              <p:cond delay="0"/>
+                            </p:stCondLst>
+                            <p:childTnLst>
+                              <p:par>
+                                <p:cTn id="13" presetID="1" presetClass="entr" presetSubtype="0" fill="hold" grpId="0" nodeType="clickEffect">
+                                  <p:stCondLst>
+                                    <p:cond delay="0"/>
+                                  </p:stCondLst>
+                                  <p:childTnLst>
+                                    <p:set>
+                                      <p:cBhvr>
+                                        <p:cTn id="14" dur="1" fill="hold">
+                                          <p:stCondLst>
+                                            <p:cond delay="0"/>
+                                          </p:stCondLst>
+                                        </p:cTn>
+                                        <p:tgtEl>
+                                          <p:spTgt spid="2">
+                                            <p:txEl>
+                                              <p:charRg st="18" end="35"/>
+                                            </p:txEl>
+                                          </p:spTgt>
+                                        </p:tgtEl>
+                                        <p:attrNameLst>
+                                          <p:attrName>style.visibility</p:attrName>
+                                        </p:attrNameLst>
+                                      </p:cBhvr>
+                                      <p:to>
+                                        <p:strVal val="visible"/>
+                                      </p:to>
+                                    </p:set>
+                                  </p:childTnLst>
+                                </p:cTn>
+                              </p:par>
+                            </p:childTnLst>
+                          </p:cTn>
+                        </p:par>
+                      </p:childTnLst>
+                    </p:cTn>
+                  </p:par>
+                  <p:par>
+                    <p:cTn id="15" fill="hold">
+                      <p:stCondLst>
+                        <p:cond delay="indefinite"/>
+                      </p:stCondLst>
+                      <p:childTnLst>
+                        <p:par>
+                          <p:cTn id="16" fill="hold">
+                            <p:stCondLst>
+                              <p:cond delay="0"/>
+                            </p:stCondLst>
+                            <p:childTnLst>
+                              <p:par>
+                                <p:cTn id="17" presetID="1" presetClass="entr" presetSubtype="0" fill="hold" grpId="0" nodeType="clickEffect">
+                                  <p:stCondLst>
+                                    <p:cond delay="0"/>
+                                  </p:stCondLst>
+                                  <p:childTnLst>
+                                    <p:set>
+                                      <p:cBhvr>
+                                        <p:cTn id="18" dur="1" fill="hold">
+                                          <p:stCondLst>
+                                            <p:cond delay="0"/>
+                                          </p:stCondLst>
+                                        </p:cTn>
+                                        <p:tgtEl>
+                                          <p:spTgt spid="2">
+                                            <p:txEl>
+                                              <p:charRg st="35" end="54"/>
+                                            </p:txEl>
+                                          </p:spTgt>
+                                        </p:tgtEl>
+                                        <p:attrNameLst>
+                                          <p:attrName>style.visibility</p:attrName>
+                                        </p:attrNameLst>
+                                      </p:cBhvr>
+                                      <p:to>
+                                        <p:strVal val="visible"/>
+                                      </p:to>
+                                    </p:set>
+                                  </p:childTnLst>
+                                </p:cTn>
+                              </p:par>
+                            </p:childTnLst>
+                          </p:cTn>
+                        </p:par>
+                      </p:childTnLst>
+                    </p:cTn>
+                  </p:par>
+                  <p:par>
+                    <p:cTn id="19" fill="hold">
+                      <p:stCondLst>
+                        <p:cond delay="indefinite"/>
+                      </p:stCondLst>
+                      <p:childTnLst>
+                        <p:par>
+                          <p:cTn id="20" fill="hold">
+                            <p:stCondLst>
+                              <p:cond delay="0"/>
+                            </p:stCondLst>
+                            <p:childTnLst>
+                              <p:par>
+                                <p:cTn id="21" presetID="1" presetClass="entr" presetSubtype="0" fill="hold" grpId="0" nodeType="clickEffect">
+                                  <p:stCondLst>
+                                    <p:cond delay="0"/>
+                                  </p:stCondLst>
+                                  <p:childTnLst>
+                                    <p:set>
+                                      <p:cBhvr>
+                                        <p:cTn id="22" dur="1" fill="hold">
+                                          <p:stCondLst>
+                                            <p:cond delay="0"/>
+                                          </p:stCondLst>
+                                        </p:cTn>
+                                        <p:tgtEl>
+                                          <p:spTgt spid="2">
+                                            <p:txEl>
+                                              <p:charRg st="54" end="71"/>
                                             </p:txEl>
                                           </p:spTgt>
                                         </p:tgtEl>
@@ -10038,7 +10957,7 @@
             </a:pPr>
             <a:r>
               <a:rPr lang="zh-CN" altLang="en-US" dirty="0"/>
-              <a:t>什么是随机梯度下降？</a:t>
+              <a:t>对于随机梯度下降，多少个样本更新一次权重？</a:t>
             </a:r>
             <a:endParaRPr lang="en-US" altLang="zh-CN" dirty="0"/>
           </a:p>
@@ -10098,53 +11017,6 @@
           </a:p>
         </p:txBody>
       </p:sp>
-      <p:pic>
-        <p:nvPicPr>
-          <p:cNvPr id="4" name="Picture 2" descr="image">
-            <a:extLst>
-              <a:ext uri="{FF2B5EF4-FFF2-40B4-BE49-F238E27FC236}">
-                <a16:creationId xmlns:a16="http://schemas.microsoft.com/office/drawing/2014/main" id="{94DB4053-E584-898A-D74D-B3343C307F1D}"/>
-              </a:ext>
-            </a:extLst>
-          </p:cNvPr>
-          <p:cNvPicPr>
-            <a:picLocks noChangeAspect="1" noChangeArrowheads="1"/>
-          </p:cNvPicPr>
-          <p:nvPr/>
-        </p:nvPicPr>
-        <p:blipFill>
-          <a:blip r:embed="rId4">
-            <a:extLst>
-              <a:ext uri="{28A0092B-C50C-407E-A947-70E740481C1C}">
-                <a14:useLocalDpi xmlns:a14="http://schemas.microsoft.com/office/drawing/2010/main" val="0"/>
-              </a:ext>
-            </a:extLst>
-          </a:blip>
-          <a:srcRect/>
-          <a:stretch>
-            <a:fillRect/>
-          </a:stretch>
-        </p:blipFill>
-        <p:spPr bwMode="auto">
-          <a:xfrm>
-            <a:off x="7400133" y="1626235"/>
-            <a:ext cx="3790519" cy="3863103"/>
-          </a:xfrm>
-          <a:prstGeom prst="rect">
-            <a:avLst/>
-          </a:prstGeom>
-          <a:noFill/>
-          <a:extLst>
-            <a:ext uri="{909E8E84-426E-40DD-AFC4-6F175D3DCCD1}">
-              <a14:hiddenFill xmlns:a14="http://schemas.microsoft.com/office/drawing/2010/main">
-                <a:solidFill>
-                  <a:srgbClr val="FFFFFF"/>
-                </a:solidFill>
-              </a14:hiddenFill>
-            </a:ext>
-          </a:extLst>
-        </p:spPr>
-      </p:pic>
     </p:spTree>
     <p:custDataLst>
       <p:tags r:id="rId1"/>
@@ -10192,7 +11064,11 @@
                                           </p:stCondLst>
                                         </p:cTn>
                                         <p:tgtEl>
-                                          <p:spTgt spid="4"/>
+                                          <p:spTgt spid="2">
+                                            <p:txEl>
+                                              <p:pRg st="0" end="0"/>
+                                            </p:txEl>
+                                          </p:spTgt>
                                         </p:tgtEl>
                                         <p:attrNameLst>
                                           <p:attrName>style.visibility</p:attrName>
@@ -10348,6 +11224,183 @@
   <p:clrMapOvr>
     <a:masterClrMapping/>
   </p:clrMapOvr>
+  <p:timing>
+    <p:tnLst>
+      <p:par>
+        <p:cTn id="1" dur="indefinite" restart="never" nodeType="tmRoot">
+          <p:childTnLst>
+            <p:seq concurrent="1" nextAc="seek">
+              <p:cTn id="2" dur="indefinite" nodeType="mainSeq">
+                <p:childTnLst>
+                  <p:par>
+                    <p:cTn id="3" fill="hold">
+                      <p:stCondLst>
+                        <p:cond delay="indefinite"/>
+                      </p:stCondLst>
+                      <p:childTnLst>
+                        <p:par>
+                          <p:cTn id="4" fill="hold">
+                            <p:stCondLst>
+                              <p:cond delay="0"/>
+                            </p:stCondLst>
+                            <p:childTnLst>
+                              <p:par>
+                                <p:cTn id="5" presetID="1" presetClass="entr" presetSubtype="0" fill="hold" nodeType="clickEffect">
+                                  <p:stCondLst>
+                                    <p:cond delay="0"/>
+                                  </p:stCondLst>
+                                  <p:childTnLst>
+                                    <p:set>
+                                      <p:cBhvr>
+                                        <p:cTn id="6" dur="1" fill="hold">
+                                          <p:stCondLst>
+                                            <p:cond delay="0"/>
+                                          </p:stCondLst>
+                                        </p:cTn>
+                                        <p:tgtEl>
+                                          <p:spTgt spid="2">
+                                            <p:txEl>
+                                              <p:pRg st="0" end="0"/>
+                                            </p:txEl>
+                                          </p:spTgt>
+                                        </p:tgtEl>
+                                        <p:attrNameLst>
+                                          <p:attrName>style.visibility</p:attrName>
+                                        </p:attrNameLst>
+                                      </p:cBhvr>
+                                      <p:to>
+                                        <p:strVal val="visible"/>
+                                      </p:to>
+                                    </p:set>
+                                  </p:childTnLst>
+                                </p:cTn>
+                              </p:par>
+                            </p:childTnLst>
+                          </p:cTn>
+                        </p:par>
+                      </p:childTnLst>
+                    </p:cTn>
+                  </p:par>
+                  <p:par>
+                    <p:cTn id="7" fill="hold">
+                      <p:stCondLst>
+                        <p:cond delay="indefinite"/>
+                      </p:stCondLst>
+                      <p:childTnLst>
+                        <p:par>
+                          <p:cTn id="8" fill="hold">
+                            <p:stCondLst>
+                              <p:cond delay="0"/>
+                            </p:stCondLst>
+                            <p:childTnLst>
+                              <p:par>
+                                <p:cTn id="9" presetID="1" presetClass="entr" presetSubtype="0" fill="hold" nodeType="clickEffect">
+                                  <p:stCondLst>
+                                    <p:cond delay="0"/>
+                                  </p:stCondLst>
+                                  <p:childTnLst>
+                                    <p:set>
+                                      <p:cBhvr>
+                                        <p:cTn id="10" dur="1" fill="hold">
+                                          <p:stCondLst>
+                                            <p:cond delay="0"/>
+                                          </p:stCondLst>
+                                        </p:cTn>
+                                        <p:tgtEl>
+                                          <p:spTgt spid="2">
+                                            <p:txEl>
+                                              <p:pRg st="1" end="1"/>
+                                            </p:txEl>
+                                          </p:spTgt>
+                                        </p:tgtEl>
+                                        <p:attrNameLst>
+                                          <p:attrName>style.visibility</p:attrName>
+                                        </p:attrNameLst>
+                                      </p:cBhvr>
+                                      <p:to>
+                                        <p:strVal val="visible"/>
+                                      </p:to>
+                                    </p:set>
+                                  </p:childTnLst>
+                                </p:cTn>
+                              </p:par>
+                            </p:childTnLst>
+                          </p:cTn>
+                        </p:par>
+                      </p:childTnLst>
+                    </p:cTn>
+                  </p:par>
+                  <p:par>
+                    <p:cTn id="11" fill="hold">
+                      <p:stCondLst>
+                        <p:cond delay="indefinite"/>
+                      </p:stCondLst>
+                      <p:childTnLst>
+                        <p:par>
+                          <p:cTn id="12" fill="hold">
+                            <p:stCondLst>
+                              <p:cond delay="0"/>
+                            </p:stCondLst>
+                            <p:childTnLst>
+                              <p:par>
+                                <p:cTn id="13" presetID="1" presetClass="entr" presetSubtype="0" fill="hold" nodeType="clickEffect">
+                                  <p:stCondLst>
+                                    <p:cond delay="0"/>
+                                  </p:stCondLst>
+                                  <p:childTnLst>
+                                    <p:set>
+                                      <p:cBhvr>
+                                        <p:cTn id="14" dur="1" fill="hold">
+                                          <p:stCondLst>
+                                            <p:cond delay="0"/>
+                                          </p:stCondLst>
+                                        </p:cTn>
+                                        <p:tgtEl>
+                                          <p:spTgt spid="2">
+                                            <p:txEl>
+                                              <p:pRg st="2" end="2"/>
+                                            </p:txEl>
+                                          </p:spTgt>
+                                        </p:tgtEl>
+                                        <p:attrNameLst>
+                                          <p:attrName>style.visibility</p:attrName>
+                                        </p:attrNameLst>
+                                      </p:cBhvr>
+                                      <p:to>
+                                        <p:strVal val="visible"/>
+                                      </p:to>
+                                    </p:set>
+                                  </p:childTnLst>
+                                </p:cTn>
+                              </p:par>
+                            </p:childTnLst>
+                          </p:cTn>
+                        </p:par>
+                      </p:childTnLst>
+                    </p:cTn>
+                  </p:par>
+                </p:childTnLst>
+              </p:cTn>
+              <p:prevCondLst>
+                <p:cond evt="onPrev" delay="0">
+                  <p:tgtEl>
+                    <p:sldTgt/>
+                  </p:tgtEl>
+                </p:cond>
+              </p:prevCondLst>
+              <p:nextCondLst>
+                <p:cond evt="onNext" delay="0">
+                  <p:tgtEl>
+                    <p:sldTgt/>
+                  </p:tgtEl>
+                </p:cond>
+              </p:nextCondLst>
+            </p:seq>
+          </p:childTnLst>
+        </p:cTn>
+      </p:par>
+    </p:tnLst>
+  </p:timing>
 </p:sld>
 </file>
 
@@ -10748,7 +11801,7 @@
             </a:pPr>
             <a:r>
               <a:rPr lang="zh-CN" altLang="en-US" dirty="0"/>
-              <a:t>它们分别是如何更新权重的？</a:t>
+              <a:t>它们分别是多少个样本更新一次权重？</a:t>
             </a:r>
             <a:endParaRPr lang="en-US" altLang="zh-CN" dirty="0"/>
           </a:p>
@@ -10901,7 +11954,7 @@
                             </p:stCondLst>
                             <p:childTnLst>
                               <p:par>
-                                <p:cTn id="5" presetID="1" presetClass="entr" presetSubtype="0" fill="hold" grpId="0" nodeType="clickEffect">
+                                <p:cTn id="5" presetID="1" presetClass="entr" presetSubtype="0" fill="hold" nodeType="clickEffect">
                                   <p:stCondLst>
                                     <p:cond delay="0"/>
                                   </p:stCondLst>
@@ -10914,7 +11967,823 @@
                                           </p:stCondLst>
                                         </p:cTn>
                                         <p:tgtEl>
-                                          <p:spTgt spid="6"/>
+                                          <p:spTgt spid="6">
+                                            <p:txEl>
+                                              <p:pRg st="0" end="0"/>
+                                            </p:txEl>
+                                          </p:spTgt>
+                                        </p:tgtEl>
+                                        <p:attrNameLst>
+                                          <p:attrName>style.visibility</p:attrName>
+                                        </p:attrNameLst>
+                                      </p:cBhvr>
+                                      <p:to>
+                                        <p:strVal val="visible"/>
+                                      </p:to>
+                                    </p:set>
+                                  </p:childTnLst>
+                                </p:cTn>
+                              </p:par>
+                            </p:childTnLst>
+                          </p:cTn>
+                        </p:par>
+                      </p:childTnLst>
+                    </p:cTn>
+                  </p:par>
+                  <p:par>
+                    <p:cTn id="7" fill="hold">
+                      <p:stCondLst>
+                        <p:cond delay="indefinite"/>
+                      </p:stCondLst>
+                      <p:childTnLst>
+                        <p:par>
+                          <p:cTn id="8" fill="hold">
+                            <p:stCondLst>
+                              <p:cond delay="0"/>
+                            </p:stCondLst>
+                            <p:childTnLst>
+                              <p:par>
+                                <p:cTn id="9" presetID="1" presetClass="entr" presetSubtype="0" fill="hold" nodeType="clickEffect">
+                                  <p:stCondLst>
+                                    <p:cond delay="0"/>
+                                  </p:stCondLst>
+                                  <p:childTnLst>
+                                    <p:set>
+                                      <p:cBhvr>
+                                        <p:cTn id="10" dur="1" fill="hold">
+                                          <p:stCondLst>
+                                            <p:cond delay="0"/>
+                                          </p:stCondLst>
+                                        </p:cTn>
+                                        <p:tgtEl>
+                                          <p:spTgt spid="6">
+                                            <p:txEl>
+                                              <p:pRg st="1" end="1"/>
+                                            </p:txEl>
+                                          </p:spTgt>
+                                        </p:tgtEl>
+                                        <p:attrNameLst>
+                                          <p:attrName>style.visibility</p:attrName>
+                                        </p:attrNameLst>
+                                      </p:cBhvr>
+                                      <p:to>
+                                        <p:strVal val="visible"/>
+                                      </p:to>
+                                    </p:set>
+                                  </p:childTnLst>
+                                </p:cTn>
+                              </p:par>
+                            </p:childTnLst>
+                          </p:cTn>
+                        </p:par>
+                      </p:childTnLst>
+                    </p:cTn>
+                  </p:par>
+                  <p:par>
+                    <p:cTn id="11" fill="hold">
+                      <p:stCondLst>
+                        <p:cond delay="indefinite"/>
+                      </p:stCondLst>
+                      <p:childTnLst>
+                        <p:par>
+                          <p:cTn id="12" fill="hold">
+                            <p:stCondLst>
+                              <p:cond delay="0"/>
+                            </p:stCondLst>
+                            <p:childTnLst>
+                              <p:par>
+                                <p:cTn id="13" presetID="1" presetClass="entr" presetSubtype="0" fill="hold" nodeType="clickEffect">
+                                  <p:stCondLst>
+                                    <p:cond delay="0"/>
+                                  </p:stCondLst>
+                                  <p:childTnLst>
+                                    <p:set>
+                                      <p:cBhvr>
+                                        <p:cTn id="14" dur="1" fill="hold">
+                                          <p:stCondLst>
+                                            <p:cond delay="0"/>
+                                          </p:stCondLst>
+                                        </p:cTn>
+                                        <p:tgtEl>
+                                          <p:spTgt spid="6">
+                                            <p:txEl>
+                                              <p:pRg st="2" end="2"/>
+                                            </p:txEl>
+                                          </p:spTgt>
+                                        </p:tgtEl>
+                                        <p:attrNameLst>
+                                          <p:attrName>style.visibility</p:attrName>
+                                        </p:attrNameLst>
+                                      </p:cBhvr>
+                                      <p:to>
+                                        <p:strVal val="visible"/>
+                                      </p:to>
+                                    </p:set>
+                                  </p:childTnLst>
+                                </p:cTn>
+                              </p:par>
+                            </p:childTnLst>
+                          </p:cTn>
+                        </p:par>
+                      </p:childTnLst>
+                    </p:cTn>
+                  </p:par>
+                  <p:par>
+                    <p:cTn id="15" fill="hold">
+                      <p:stCondLst>
+                        <p:cond delay="indefinite"/>
+                      </p:stCondLst>
+                      <p:childTnLst>
+                        <p:par>
+                          <p:cTn id="16" fill="hold">
+                            <p:stCondLst>
+                              <p:cond delay="0"/>
+                            </p:stCondLst>
+                            <p:childTnLst>
+                              <p:par>
+                                <p:cTn id="17" presetID="1" presetClass="entr" presetSubtype="0" fill="hold" nodeType="clickEffect">
+                                  <p:stCondLst>
+                                    <p:cond delay="0"/>
+                                  </p:stCondLst>
+                                  <p:childTnLst>
+                                    <p:set>
+                                      <p:cBhvr>
+                                        <p:cTn id="18" dur="1" fill="hold">
+                                          <p:stCondLst>
+                                            <p:cond delay="0"/>
+                                          </p:stCondLst>
+                                        </p:cTn>
+                                        <p:tgtEl>
+                                          <p:spTgt spid="6">
+                                            <p:txEl>
+                                              <p:pRg st="3" end="3"/>
+                                            </p:txEl>
+                                          </p:spTgt>
+                                        </p:tgtEl>
+                                        <p:attrNameLst>
+                                          <p:attrName>style.visibility</p:attrName>
+                                        </p:attrNameLst>
+                                      </p:cBhvr>
+                                      <p:to>
+                                        <p:strVal val="visible"/>
+                                      </p:to>
+                                    </p:set>
+                                  </p:childTnLst>
+                                </p:cTn>
+                              </p:par>
+                            </p:childTnLst>
+                          </p:cTn>
+                        </p:par>
+                      </p:childTnLst>
+                    </p:cTn>
+                  </p:par>
+                  <p:par>
+                    <p:cTn id="19" fill="hold">
+                      <p:stCondLst>
+                        <p:cond delay="indefinite"/>
+                      </p:stCondLst>
+                      <p:childTnLst>
+                        <p:par>
+                          <p:cTn id="20" fill="hold">
+                            <p:stCondLst>
+                              <p:cond delay="0"/>
+                            </p:stCondLst>
+                            <p:childTnLst>
+                              <p:par>
+                                <p:cTn id="21" presetID="1" presetClass="entr" presetSubtype="0" fill="hold" nodeType="clickEffect">
+                                  <p:stCondLst>
+                                    <p:cond delay="0"/>
+                                  </p:stCondLst>
+                                  <p:childTnLst>
+                                    <p:set>
+                                      <p:cBhvr>
+                                        <p:cTn id="22" dur="1" fill="hold">
+                                          <p:stCondLst>
+                                            <p:cond delay="0"/>
+                                          </p:stCondLst>
+                                        </p:cTn>
+                                        <p:tgtEl>
+                                          <p:spTgt spid="6">
+                                            <p:txEl>
+                                              <p:pRg st="4" end="4"/>
+                                            </p:txEl>
+                                          </p:spTgt>
+                                        </p:tgtEl>
+                                        <p:attrNameLst>
+                                          <p:attrName>style.visibility</p:attrName>
+                                        </p:attrNameLst>
+                                      </p:cBhvr>
+                                      <p:to>
+                                        <p:strVal val="visible"/>
+                                      </p:to>
+                                    </p:set>
+                                  </p:childTnLst>
+                                </p:cTn>
+                              </p:par>
+                            </p:childTnLst>
+                          </p:cTn>
+                        </p:par>
+                      </p:childTnLst>
+                    </p:cTn>
+                  </p:par>
+                </p:childTnLst>
+              </p:cTn>
+              <p:prevCondLst>
+                <p:cond evt="onPrev" delay="0">
+                  <p:tgtEl>
+                    <p:sldTgt/>
+                  </p:tgtEl>
+                </p:cond>
+              </p:prevCondLst>
+              <p:nextCondLst>
+                <p:cond evt="onNext" delay="0">
+                  <p:tgtEl>
+                    <p:sldTgt/>
+                  </p:tgtEl>
+                </p:cond>
+              </p:nextCondLst>
+            </p:seq>
+          </p:childTnLst>
+        </p:cTn>
+      </p:par>
+    </p:tnLst>
+  </p:timing>
+</p:sld>
+</file>
+
+<file path=ppt/slides/slide8.xml><?xml version="1.0" encoding="utf-8"?>
+<p:sld xmlns:a="http://schemas.openxmlformats.org/drawingml/2006/main" xmlns:r="http://schemas.openxmlformats.org/officeDocument/2006/relationships" xmlns:p="http://schemas.openxmlformats.org/presentationml/2006/main">
+  <p:cSld>
+    <p:spTree>
+      <p:nvGrpSpPr>
+        <p:cNvPr id="1" name=""/>
+        <p:cNvGrpSpPr/>
+        <p:nvPr/>
+      </p:nvGrpSpPr>
+      <p:grpSpPr>
+        <a:xfrm>
+          <a:off x="0" y="0"/>
+          <a:ext cx="0" cy="0"/>
+          <a:chOff x="0" y="0"/>
+          <a:chExt cx="0" cy="0"/>
+        </a:xfrm>
+      </p:grpSpPr>
+      <p:sp>
+        <p:nvSpPr>
+          <p:cNvPr id="3" name="标题 2"/>
+          <p:cNvSpPr>
+            <a:spLocks noGrp="1"/>
+          </p:cNvSpPr>
+          <p:nvPr>
+            <p:ph type="title"/>
+          </p:nvPr>
+        </p:nvSpPr>
+        <p:spPr/>
+        <p:txBody>
+          <a:bodyPr/>
+          <a:lstStyle/>
+          <a:p>
+            <a:r>
+              <a:rPr lang="zh-CN" altLang="en-US" dirty="0">
+                <a:sym typeface="+mn-ea"/>
+              </a:rPr>
+              <a:t>主问题：</a:t>
+            </a:r>
+            <a:r>
+              <a:rPr lang="zh-CN" altLang="en-US" dirty="0"/>
+              <a:t>如何充分利用</a:t>
+            </a:r>
+            <a:r>
+              <a:rPr lang="en-US" altLang="zh-CN" dirty="0"/>
+              <a:t>CPU</a:t>
+            </a:r>
+            <a:r>
+              <a:rPr lang="zh-CN" altLang="en-US" dirty="0"/>
+              <a:t>缓存？</a:t>
+            </a:r>
+            <a:endParaRPr dirty="0">
+              <a:sym typeface="+mn-ea"/>
+            </a:endParaRPr>
+          </a:p>
+        </p:txBody>
+      </p:sp>
+      <p:sp>
+        <p:nvSpPr>
+          <p:cNvPr id="6" name="文本占位符 1">
+            <a:extLst>
+              <a:ext uri="{FF2B5EF4-FFF2-40B4-BE49-F238E27FC236}">
+                <a16:creationId xmlns:a16="http://schemas.microsoft.com/office/drawing/2014/main" id="{BA88068A-4FDC-6963-46A5-ADEC46CDA15E}"/>
+              </a:ext>
+            </a:extLst>
+          </p:cNvPr>
+          <p:cNvSpPr txBox="1">
+            <a:spLocks/>
+          </p:cNvSpPr>
+          <p:nvPr/>
+        </p:nvSpPr>
+        <p:spPr>
+          <a:xfrm>
+            <a:off x="822325" y="1778635"/>
+            <a:ext cx="10852150" cy="4553585"/>
+          </a:xfrm>
+        </p:spPr>
+        <p:txBody>
+          <a:bodyPr lIns="101600" tIns="38100" rIns="76200" bIns="38100">
+            <a:noAutofit/>
+          </a:bodyPr>
+          <a:lstStyle>
+            <a:lvl1pPr marL="0" indent="0" algn="l" defTabSz="914400" rtl="0" eaLnBrk="1" fontAlgn="auto" latinLnBrk="0" hangingPunct="1">
+              <a:lnSpc>
+                <a:spcPct val="130000"/>
+              </a:lnSpc>
+              <a:spcBef>
+                <a:spcPts val="0"/>
+              </a:spcBef>
+              <a:spcAft>
+                <a:spcPts val="1000"/>
+              </a:spcAft>
+              <a:buFont typeface="Arial" panose="020B0604020202020204" pitchFamily="34" charset="0"/>
+              <a:buNone/>
+              <a:defRPr kumimoji="0" lang="zh-CN" altLang="en-US" sz="1600" b="0" i="0" u="none" strike="noStrike" kern="1200" cap="none" spc="150" normalizeH="0" baseline="0" noProof="1">
+                <a:solidFill>
+                  <a:schemeClr val="tx1"/>
+                </a:solidFill>
+                <a:uFillTx/>
+                <a:latin typeface="+mn-lt"/>
+                <a:ea typeface="+mn-ea"/>
+                <a:cs typeface="+mn-cs"/>
+                <a:sym typeface="+mn-ea"/>
+              </a:defRPr>
+            </a:lvl1pPr>
+            <a:lvl2pPr marL="457200" indent="0" algn="l" defTabSz="914400" rtl="0" eaLnBrk="1" fontAlgn="auto" latinLnBrk="0" hangingPunct="1">
+              <a:lnSpc>
+                <a:spcPct val="130000"/>
+              </a:lnSpc>
+              <a:spcBef>
+                <a:spcPts val="0"/>
+              </a:spcBef>
+              <a:spcAft>
+                <a:spcPts val="1000"/>
+              </a:spcAft>
+              <a:buFont typeface="Arial" panose="020B0604020202020204" pitchFamily="34" charset="0"/>
+              <a:buNone/>
+              <a:tabLst>
+                <a:tab pos="1609725" algn="l"/>
+              </a:tabLst>
+              <a:defRPr sz="2000" u="none" strike="noStrike" kern="1200" cap="none" spc="150" normalizeH="0" baseline="0">
+                <a:solidFill>
+                  <a:schemeClr val="tx1">
+                    <a:tint val="75000"/>
+                  </a:schemeClr>
+                </a:solidFill>
+                <a:uFillTx/>
+                <a:latin typeface="+mn-lt"/>
+                <a:ea typeface="+mn-ea"/>
+                <a:cs typeface="+mn-cs"/>
+              </a:defRPr>
+            </a:lvl2pPr>
+            <a:lvl3pPr marL="914400" indent="0" algn="l" defTabSz="914400" rtl="0" eaLnBrk="1" fontAlgn="auto" latinLnBrk="0" hangingPunct="1">
+              <a:lnSpc>
+                <a:spcPct val="130000"/>
+              </a:lnSpc>
+              <a:spcBef>
+                <a:spcPts val="0"/>
+              </a:spcBef>
+              <a:spcAft>
+                <a:spcPts val="1000"/>
+              </a:spcAft>
+              <a:buFont typeface="Arial" panose="020B0604020202020204" pitchFamily="34" charset="0"/>
+              <a:buNone/>
+              <a:defRPr sz="1800" u="none" strike="noStrike" kern="1200" cap="none" spc="150" normalizeH="0" baseline="0">
+                <a:solidFill>
+                  <a:schemeClr val="tx1">
+                    <a:tint val="75000"/>
+                  </a:schemeClr>
+                </a:solidFill>
+                <a:uFillTx/>
+                <a:latin typeface="+mn-lt"/>
+                <a:ea typeface="+mn-ea"/>
+                <a:cs typeface="+mn-cs"/>
+              </a:defRPr>
+            </a:lvl3pPr>
+            <a:lvl4pPr marL="1371600" indent="0" algn="l" defTabSz="914400" rtl="0" eaLnBrk="1" fontAlgn="auto" latinLnBrk="0" hangingPunct="1">
+              <a:lnSpc>
+                <a:spcPct val="130000"/>
+              </a:lnSpc>
+              <a:spcBef>
+                <a:spcPts val="0"/>
+              </a:spcBef>
+              <a:spcAft>
+                <a:spcPts val="1000"/>
+              </a:spcAft>
+              <a:buFont typeface="Arial" panose="020B0604020202020204" pitchFamily="34" charset="0"/>
+              <a:buNone/>
+              <a:defRPr sz="1600" u="none" strike="noStrike" kern="1200" cap="none" spc="150" normalizeH="0" baseline="0">
+                <a:solidFill>
+                  <a:schemeClr val="tx1">
+                    <a:tint val="75000"/>
+                  </a:schemeClr>
+                </a:solidFill>
+                <a:uFillTx/>
+                <a:latin typeface="+mn-lt"/>
+                <a:ea typeface="+mn-ea"/>
+                <a:cs typeface="+mn-cs"/>
+              </a:defRPr>
+            </a:lvl4pPr>
+            <a:lvl5pPr marL="1828800" indent="0" algn="l" defTabSz="914400" rtl="0" eaLnBrk="1" fontAlgn="auto" latinLnBrk="0" hangingPunct="1">
+              <a:lnSpc>
+                <a:spcPct val="130000"/>
+              </a:lnSpc>
+              <a:spcBef>
+                <a:spcPts val="0"/>
+              </a:spcBef>
+              <a:spcAft>
+                <a:spcPts val="1000"/>
+              </a:spcAft>
+              <a:buFont typeface="Arial" panose="020B0604020202020204" pitchFamily="34" charset="0"/>
+              <a:buNone/>
+              <a:defRPr sz="1600" u="none" strike="noStrike" kern="1200" cap="none" spc="150" normalizeH="0" baseline="0">
+                <a:solidFill>
+                  <a:schemeClr val="tx1">
+                    <a:tint val="75000"/>
+                  </a:schemeClr>
+                </a:solidFill>
+                <a:uFillTx/>
+                <a:latin typeface="+mn-lt"/>
+                <a:ea typeface="+mn-ea"/>
+                <a:cs typeface="+mn-cs"/>
+              </a:defRPr>
+            </a:lvl5pPr>
+            <a:lvl6pPr marL="2286000" indent="0" algn="l" defTabSz="914400" rtl="0" eaLnBrk="1" latinLnBrk="0" hangingPunct="1">
+              <a:lnSpc>
+                <a:spcPct val="90000"/>
+              </a:lnSpc>
+              <a:spcBef>
+                <a:spcPts val="500"/>
+              </a:spcBef>
+              <a:buFont typeface="Arial" panose="020B0604020202020204" pitchFamily="34" charset="0"/>
+              <a:buNone/>
+              <a:defRPr sz="1600" kern="1200">
+                <a:solidFill>
+                  <a:schemeClr val="tx1">
+                    <a:tint val="75000"/>
+                  </a:schemeClr>
+                </a:solidFill>
+                <a:latin typeface="+mn-lt"/>
+                <a:ea typeface="+mn-ea"/>
+                <a:cs typeface="+mn-cs"/>
+              </a:defRPr>
+            </a:lvl6pPr>
+            <a:lvl7pPr marL="2743200" indent="0" algn="l" defTabSz="914400" rtl="0" eaLnBrk="1" latinLnBrk="0" hangingPunct="1">
+              <a:lnSpc>
+                <a:spcPct val="90000"/>
+              </a:lnSpc>
+              <a:spcBef>
+                <a:spcPts val="500"/>
+              </a:spcBef>
+              <a:buFont typeface="Arial" panose="020B0604020202020204" pitchFamily="34" charset="0"/>
+              <a:buNone/>
+              <a:defRPr sz="1600" kern="1200">
+                <a:solidFill>
+                  <a:schemeClr val="tx1">
+                    <a:tint val="75000"/>
+                  </a:schemeClr>
+                </a:solidFill>
+                <a:latin typeface="+mn-lt"/>
+                <a:ea typeface="+mn-ea"/>
+                <a:cs typeface="+mn-cs"/>
+              </a:defRPr>
+            </a:lvl7pPr>
+            <a:lvl8pPr marL="3200400" indent="0" algn="l" defTabSz="914400" rtl="0" eaLnBrk="1" latinLnBrk="0" hangingPunct="1">
+              <a:lnSpc>
+                <a:spcPct val="90000"/>
+              </a:lnSpc>
+              <a:spcBef>
+                <a:spcPts val="500"/>
+              </a:spcBef>
+              <a:buFont typeface="Arial" panose="020B0604020202020204" pitchFamily="34" charset="0"/>
+              <a:buNone/>
+              <a:defRPr sz="1600" kern="1200">
+                <a:solidFill>
+                  <a:schemeClr val="tx1">
+                    <a:tint val="75000"/>
+                  </a:schemeClr>
+                </a:solidFill>
+                <a:latin typeface="+mn-lt"/>
+                <a:ea typeface="+mn-ea"/>
+                <a:cs typeface="+mn-cs"/>
+              </a:defRPr>
+            </a:lvl8pPr>
+            <a:lvl9pPr marL="3657600" indent="0" algn="l" defTabSz="914400" rtl="0" eaLnBrk="1" latinLnBrk="0" hangingPunct="1">
+              <a:lnSpc>
+                <a:spcPct val="90000"/>
+              </a:lnSpc>
+              <a:spcBef>
+                <a:spcPts val="500"/>
+              </a:spcBef>
+              <a:buFont typeface="Arial" panose="020B0604020202020204" pitchFamily="34" charset="0"/>
+              <a:buNone/>
+              <a:defRPr sz="1600" kern="1200">
+                <a:solidFill>
+                  <a:schemeClr val="tx1">
+                    <a:tint val="75000"/>
+                  </a:schemeClr>
+                </a:solidFill>
+                <a:latin typeface="+mn-lt"/>
+                <a:ea typeface="+mn-ea"/>
+                <a:cs typeface="+mn-cs"/>
+              </a:defRPr>
+            </a:lvl9pPr>
+          </a:lstStyle>
+          <a:p>
+            <a:pPr marL="285750" indent="-285750">
+              <a:buFont typeface="Arial" panose="020B0604020202020204" pitchFamily="34" charset="0"/>
+              <a:buChar char="•"/>
+            </a:pPr>
+            <a:r>
+              <a:rPr lang="zh-CN" altLang="en-US" dirty="0"/>
+              <a:t>能否提出一个折中的方法？</a:t>
+            </a:r>
+            <a:endParaRPr lang="en-US" altLang="zh-CN" dirty="0"/>
+          </a:p>
+          <a:p>
+            <a:pPr marL="285750" indent="-285750">
+              <a:buFont typeface="Arial" panose="020B0604020202020204" pitchFamily="34" charset="0"/>
+              <a:buChar char="•"/>
+            </a:pPr>
+            <a:r>
+              <a:rPr lang="zh-CN" altLang="en-US" dirty="0"/>
+              <a:t>该方法有什么优势？</a:t>
+            </a:r>
+            <a:endParaRPr lang="en-US" altLang="zh-CN" dirty="0"/>
+          </a:p>
+          <a:p>
+            <a:pPr marL="285750" indent="-285750">
+              <a:buFont typeface="Arial" panose="020B0604020202020204" pitchFamily="34" charset="0"/>
+              <a:buChar char="•"/>
+            </a:pPr>
+            <a:endParaRPr lang="en-US" altLang="zh-CN" dirty="0"/>
+          </a:p>
+          <a:p>
+            <a:endParaRPr lang="en-US" altLang="zh-CN" dirty="0"/>
+          </a:p>
+          <a:p>
+            <a:pPr marL="285750" indent="-285750">
+              <a:buFont typeface="Arial" panose="020B0604020202020204" pitchFamily="34" charset="0"/>
+              <a:buChar char="•"/>
+            </a:pPr>
+            <a:r>
+              <a:rPr lang="zh-CN" altLang="en-US" dirty="0"/>
+              <a:t>自学、互学、展学</a:t>
+            </a:r>
+          </a:p>
+          <a:p>
+            <a:pPr marL="285750" indent="-285750">
+              <a:buFont typeface="Arial" panose="020B0604020202020204" pitchFamily="34" charset="0"/>
+              <a:buChar char="•"/>
+            </a:pPr>
+            <a:endParaRPr lang="zh-CN" altLang="en-US" dirty="0"/>
+          </a:p>
+          <a:p>
+            <a:pPr marL="285750" indent="-285750">
+              <a:buFont typeface="Arial" panose="020B0604020202020204" pitchFamily="34" charset="0"/>
+              <a:buChar char="•"/>
+            </a:pPr>
+            <a:endParaRPr lang="en-US" altLang="zh-CN" dirty="0"/>
+          </a:p>
+          <a:p>
+            <a:pPr marL="285750" indent="-285750">
+              <a:buFont typeface="Arial" panose="020B0604020202020204" pitchFamily="34" charset="0"/>
+              <a:buChar char="•"/>
+            </a:pPr>
+            <a:endParaRPr lang="zh-CN" altLang="en-US" dirty="0"/>
+          </a:p>
+          <a:p>
+            <a:pPr marL="285750" indent="-285750">
+              <a:buFont typeface="Arial" panose="020B0604020202020204" pitchFamily="34" charset="0"/>
+              <a:buChar char="•"/>
+            </a:pPr>
+            <a:endParaRPr lang="zh-CN" altLang="en-US" dirty="0"/>
+          </a:p>
+          <a:p>
+            <a:pPr marL="285750" indent="-285750">
+              <a:buFont typeface="Arial" panose="020B0604020202020204" pitchFamily="34" charset="0"/>
+              <a:buChar char="•"/>
+            </a:pPr>
+            <a:endParaRPr lang="zh-CN" altLang="en-US" dirty="0"/>
+          </a:p>
+          <a:p>
+            <a:pPr marL="285750" indent="-285750">
+              <a:buFont typeface="Arial" panose="020B0604020202020204" pitchFamily="34" charset="0"/>
+              <a:buChar char="•"/>
+            </a:pPr>
+            <a:endParaRPr lang="zh-CN" altLang="en-US" dirty="0"/>
+          </a:p>
+          <a:p>
+            <a:pPr marL="285750" indent="-285750">
+              <a:buFont typeface="Arial" panose="020B0604020202020204" pitchFamily="34" charset="0"/>
+              <a:buChar char="•"/>
+            </a:pPr>
+            <a:endParaRPr lang="zh-CN" altLang="en-US" dirty="0"/>
+          </a:p>
+          <a:p>
+            <a:pPr marL="285750" indent="-285750">
+              <a:buFont typeface="Arial" panose="020B0604020202020204" pitchFamily="34" charset="0"/>
+              <a:buChar char="•"/>
+            </a:pPr>
+            <a:endParaRPr lang="zh-CN" altLang="en-US" dirty="0"/>
+          </a:p>
+          <a:p>
+            <a:pPr marL="285750" indent="-285750">
+              <a:buFont typeface="Arial" panose="020B0604020202020204" pitchFamily="34" charset="0"/>
+              <a:buChar char="•"/>
+            </a:pPr>
+            <a:endParaRPr lang="zh-CN" altLang="en-US" dirty="0"/>
+          </a:p>
+        </p:txBody>
+      </p:sp>
+      <p:sp>
+        <p:nvSpPr>
+          <p:cNvPr id="2" name="文本框 1">
+            <a:extLst>
+              <a:ext uri="{FF2B5EF4-FFF2-40B4-BE49-F238E27FC236}">
+                <a16:creationId xmlns:a16="http://schemas.microsoft.com/office/drawing/2014/main" id="{0BA7B52B-BFD6-2E84-23DA-975B1E5015D6}"/>
+              </a:ext>
+            </a:extLst>
+          </p:cNvPr>
+          <p:cNvSpPr txBox="1"/>
+          <p:nvPr/>
+        </p:nvSpPr>
+        <p:spPr>
+          <a:xfrm>
+            <a:off x="7584141" y="2380129"/>
+            <a:ext cx="2262158" cy="369332"/>
+          </a:xfrm>
+          <a:prstGeom prst="rect">
+            <a:avLst/>
+          </a:prstGeom>
+          <a:noFill/>
+        </p:spPr>
+        <p:txBody>
+          <a:bodyPr wrap="none" rtlCol="0">
+            <a:spAutoFit/>
+          </a:bodyPr>
+          <a:lstStyle/>
+          <a:p>
+            <a:r>
+              <a:rPr lang="zh-CN" altLang="en-US" dirty="0"/>
+              <a:t>小批量随机梯度下降</a:t>
+            </a:r>
+            <a:endParaRPr kumimoji="1" lang="zh-CN" altLang="en-US" dirty="0"/>
+          </a:p>
+        </p:txBody>
+      </p:sp>
+    </p:spTree>
+    <p:custDataLst>
+      <p:tags r:id="rId1"/>
+    </p:custDataLst>
+    <p:extLst>
+      <p:ext uri="{BB962C8B-B14F-4D97-AF65-F5344CB8AC3E}">
+        <p14:creationId xmlns:p14="http://schemas.microsoft.com/office/powerpoint/2010/main" val="906653231"/>
+      </p:ext>
+    </p:extLst>
+  </p:cSld>
+  <p:clrMapOvr>
+    <a:masterClrMapping/>
+  </p:clrMapOvr>
+  <p:timing>
+    <p:tnLst>
+      <p:par>
+        <p:cTn id="1" dur="indefinite" restart="never" nodeType="tmRoot">
+          <p:childTnLst>
+            <p:seq concurrent="1" nextAc="seek">
+              <p:cTn id="2" dur="indefinite" nodeType="mainSeq">
+                <p:childTnLst>
+                  <p:par>
+                    <p:cTn id="3" fill="hold">
+                      <p:stCondLst>
+                        <p:cond delay="indefinite"/>
+                      </p:stCondLst>
+                      <p:childTnLst>
+                        <p:par>
+                          <p:cTn id="4" fill="hold">
+                            <p:stCondLst>
+                              <p:cond delay="0"/>
+                            </p:stCondLst>
+                            <p:childTnLst>
+                              <p:par>
+                                <p:cTn id="5" presetID="1" presetClass="entr" presetSubtype="0" fill="hold" nodeType="clickEffect">
+                                  <p:stCondLst>
+                                    <p:cond delay="0"/>
+                                  </p:stCondLst>
+                                  <p:childTnLst>
+                                    <p:set>
+                                      <p:cBhvr>
+                                        <p:cTn id="6" dur="1" fill="hold">
+                                          <p:stCondLst>
+                                            <p:cond delay="0"/>
+                                          </p:stCondLst>
+                                        </p:cTn>
+                                        <p:tgtEl>
+                                          <p:spTgt spid="6">
+                                            <p:txEl>
+                                              <p:pRg st="0" end="0"/>
+                                            </p:txEl>
+                                          </p:spTgt>
+                                        </p:tgtEl>
+                                        <p:attrNameLst>
+                                          <p:attrName>style.visibility</p:attrName>
+                                        </p:attrNameLst>
+                                      </p:cBhvr>
+                                      <p:to>
+                                        <p:strVal val="visible"/>
+                                      </p:to>
+                                    </p:set>
+                                  </p:childTnLst>
+                                </p:cTn>
+                              </p:par>
+                            </p:childTnLst>
+                          </p:cTn>
+                        </p:par>
+                      </p:childTnLst>
+                    </p:cTn>
+                  </p:par>
+                  <p:par>
+                    <p:cTn id="7" fill="hold">
+                      <p:stCondLst>
+                        <p:cond delay="indefinite"/>
+                      </p:stCondLst>
+                      <p:childTnLst>
+                        <p:par>
+                          <p:cTn id="8" fill="hold">
+                            <p:stCondLst>
+                              <p:cond delay="0"/>
+                            </p:stCondLst>
+                            <p:childTnLst>
+                              <p:par>
+                                <p:cTn id="9" presetID="1" presetClass="entr" presetSubtype="0" fill="hold" grpId="0" nodeType="clickEffect">
+                                  <p:stCondLst>
+                                    <p:cond delay="0"/>
+                                  </p:stCondLst>
+                                  <p:childTnLst>
+                                    <p:set>
+                                      <p:cBhvr>
+                                        <p:cTn id="10" dur="1" fill="hold">
+                                          <p:stCondLst>
+                                            <p:cond delay="0"/>
+                                          </p:stCondLst>
+                                        </p:cTn>
+                                        <p:tgtEl>
+                                          <p:spTgt spid="2"/>
+                                        </p:tgtEl>
+                                        <p:attrNameLst>
+                                          <p:attrName>style.visibility</p:attrName>
+                                        </p:attrNameLst>
+                                      </p:cBhvr>
+                                      <p:to>
+                                        <p:strVal val="visible"/>
+                                      </p:to>
+                                    </p:set>
+                                  </p:childTnLst>
+                                </p:cTn>
+                              </p:par>
+                            </p:childTnLst>
+                          </p:cTn>
+                        </p:par>
+                      </p:childTnLst>
+                    </p:cTn>
+                  </p:par>
+                  <p:par>
+                    <p:cTn id="11" fill="hold">
+                      <p:stCondLst>
+                        <p:cond delay="indefinite"/>
+                      </p:stCondLst>
+                      <p:childTnLst>
+                        <p:par>
+                          <p:cTn id="12" fill="hold">
+                            <p:stCondLst>
+                              <p:cond delay="0"/>
+                            </p:stCondLst>
+                            <p:childTnLst>
+                              <p:par>
+                                <p:cTn id="13" presetID="1" presetClass="entr" presetSubtype="0" fill="hold" nodeType="clickEffect">
+                                  <p:stCondLst>
+                                    <p:cond delay="0"/>
+                                  </p:stCondLst>
+                                  <p:childTnLst>
+                                    <p:set>
+                                      <p:cBhvr>
+                                        <p:cTn id="14" dur="1" fill="hold">
+                                          <p:stCondLst>
+                                            <p:cond delay="0"/>
+                                          </p:stCondLst>
+                                        </p:cTn>
+                                        <p:tgtEl>
+                                          <p:spTgt spid="6">
+                                            <p:txEl>
+                                              <p:pRg st="1" end="1"/>
+                                            </p:txEl>
+                                          </p:spTgt>
                                         </p:tgtEl>
                                         <p:attrNameLst>
                                           <p:attrName>style.visibility</p:attrName>
@@ -10955,492 +12824,7 @@
       </p:par>
     </p:tnLst>
     <p:bldLst>
-      <p:bldP spid="6" grpId="0"/>
-    </p:bldLst>
-  </p:timing>
-</p:sld>
-</file>
-
-<file path=ppt/slides/slide8.xml><?xml version="1.0" encoding="utf-8"?>
-<p:sld xmlns:a="http://schemas.openxmlformats.org/drawingml/2006/main" xmlns:r="http://schemas.openxmlformats.org/officeDocument/2006/relationships" xmlns:p="http://schemas.openxmlformats.org/presentationml/2006/main">
-  <p:cSld>
-    <p:spTree>
-      <p:nvGrpSpPr>
-        <p:cNvPr id="1" name=""/>
-        <p:cNvGrpSpPr/>
-        <p:nvPr/>
-      </p:nvGrpSpPr>
-      <p:grpSpPr>
-        <a:xfrm>
-          <a:off x="0" y="0"/>
-          <a:ext cx="0" cy="0"/>
-          <a:chOff x="0" y="0"/>
-          <a:chExt cx="0" cy="0"/>
-        </a:xfrm>
-      </p:grpSpPr>
-      <p:sp>
-        <p:nvSpPr>
-          <p:cNvPr id="3" name="标题 2"/>
-          <p:cNvSpPr>
-            <a:spLocks noGrp="1"/>
-          </p:cNvSpPr>
-          <p:nvPr>
-            <p:ph type="title"/>
-          </p:nvPr>
-        </p:nvSpPr>
-        <p:spPr/>
-        <p:txBody>
-          <a:bodyPr/>
-          <a:lstStyle/>
-          <a:p>
-            <a:r>
-              <a:rPr lang="zh-CN" altLang="en-US" dirty="0">
-                <a:sym typeface="+mn-ea"/>
-              </a:rPr>
-              <a:t>主问题：</a:t>
-            </a:r>
-            <a:r>
-              <a:rPr lang="zh-CN" altLang="en-US" dirty="0"/>
-              <a:t>如何充分利用</a:t>
-            </a:r>
-            <a:r>
-              <a:rPr lang="en-US" altLang="zh-CN" dirty="0"/>
-              <a:t>CPU</a:t>
-            </a:r>
-            <a:r>
-              <a:rPr lang="zh-CN" altLang="en-US" dirty="0"/>
-              <a:t>缓存？</a:t>
-            </a:r>
-            <a:endParaRPr dirty="0">
-              <a:sym typeface="+mn-ea"/>
-            </a:endParaRPr>
-          </a:p>
-        </p:txBody>
-      </p:sp>
-      <p:sp>
-        <p:nvSpPr>
-          <p:cNvPr id="6" name="文本占位符 1">
-            <a:extLst>
-              <a:ext uri="{FF2B5EF4-FFF2-40B4-BE49-F238E27FC236}">
-                <a16:creationId xmlns:a16="http://schemas.microsoft.com/office/drawing/2014/main" id="{BA88068A-4FDC-6963-46A5-ADEC46CDA15E}"/>
-              </a:ext>
-            </a:extLst>
-          </p:cNvPr>
-          <p:cNvSpPr txBox="1">
-            <a:spLocks/>
-          </p:cNvSpPr>
-          <p:nvPr/>
-        </p:nvSpPr>
-        <p:spPr>
-          <a:xfrm>
-            <a:off x="822325" y="1778635"/>
-            <a:ext cx="10852150" cy="4553585"/>
-          </a:xfrm>
-        </p:spPr>
-        <p:txBody>
-          <a:bodyPr lIns="101600" tIns="38100" rIns="76200" bIns="38100">
-            <a:noAutofit/>
-          </a:bodyPr>
-          <a:lstStyle>
-            <a:lvl1pPr marL="0" indent="0" algn="l" defTabSz="914400" rtl="0" eaLnBrk="1" fontAlgn="auto" latinLnBrk="0" hangingPunct="1">
-              <a:lnSpc>
-                <a:spcPct val="130000"/>
-              </a:lnSpc>
-              <a:spcBef>
-                <a:spcPts val="0"/>
-              </a:spcBef>
-              <a:spcAft>
-                <a:spcPts val="1000"/>
-              </a:spcAft>
-              <a:buFont typeface="Arial" panose="020B0604020202020204" pitchFamily="34" charset="0"/>
-              <a:buNone/>
-              <a:defRPr kumimoji="0" lang="zh-CN" altLang="en-US" sz="1600" b="0" i="0" u="none" strike="noStrike" kern="1200" cap="none" spc="150" normalizeH="0" baseline="0" noProof="1">
-                <a:solidFill>
-                  <a:schemeClr val="tx1"/>
-                </a:solidFill>
-                <a:uFillTx/>
-                <a:latin typeface="+mn-lt"/>
-                <a:ea typeface="+mn-ea"/>
-                <a:cs typeface="+mn-cs"/>
-                <a:sym typeface="+mn-ea"/>
-              </a:defRPr>
-            </a:lvl1pPr>
-            <a:lvl2pPr marL="457200" indent="0" algn="l" defTabSz="914400" rtl="0" eaLnBrk="1" fontAlgn="auto" latinLnBrk="0" hangingPunct="1">
-              <a:lnSpc>
-                <a:spcPct val="130000"/>
-              </a:lnSpc>
-              <a:spcBef>
-                <a:spcPts val="0"/>
-              </a:spcBef>
-              <a:spcAft>
-                <a:spcPts val="1000"/>
-              </a:spcAft>
-              <a:buFont typeface="Arial" panose="020B0604020202020204" pitchFamily="34" charset="0"/>
-              <a:buNone/>
-              <a:tabLst>
-                <a:tab pos="1609725" algn="l"/>
-              </a:tabLst>
-              <a:defRPr sz="2000" u="none" strike="noStrike" kern="1200" cap="none" spc="150" normalizeH="0" baseline="0">
-                <a:solidFill>
-                  <a:schemeClr val="tx1">
-                    <a:tint val="75000"/>
-                  </a:schemeClr>
-                </a:solidFill>
-                <a:uFillTx/>
-                <a:latin typeface="+mn-lt"/>
-                <a:ea typeface="+mn-ea"/>
-                <a:cs typeface="+mn-cs"/>
-              </a:defRPr>
-            </a:lvl2pPr>
-            <a:lvl3pPr marL="914400" indent="0" algn="l" defTabSz="914400" rtl="0" eaLnBrk="1" fontAlgn="auto" latinLnBrk="0" hangingPunct="1">
-              <a:lnSpc>
-                <a:spcPct val="130000"/>
-              </a:lnSpc>
-              <a:spcBef>
-                <a:spcPts val="0"/>
-              </a:spcBef>
-              <a:spcAft>
-                <a:spcPts val="1000"/>
-              </a:spcAft>
-              <a:buFont typeface="Arial" panose="020B0604020202020204" pitchFamily="34" charset="0"/>
-              <a:buNone/>
-              <a:defRPr sz="1800" u="none" strike="noStrike" kern="1200" cap="none" spc="150" normalizeH="0" baseline="0">
-                <a:solidFill>
-                  <a:schemeClr val="tx1">
-                    <a:tint val="75000"/>
-                  </a:schemeClr>
-                </a:solidFill>
-                <a:uFillTx/>
-                <a:latin typeface="+mn-lt"/>
-                <a:ea typeface="+mn-ea"/>
-                <a:cs typeface="+mn-cs"/>
-              </a:defRPr>
-            </a:lvl3pPr>
-            <a:lvl4pPr marL="1371600" indent="0" algn="l" defTabSz="914400" rtl="0" eaLnBrk="1" fontAlgn="auto" latinLnBrk="0" hangingPunct="1">
-              <a:lnSpc>
-                <a:spcPct val="130000"/>
-              </a:lnSpc>
-              <a:spcBef>
-                <a:spcPts val="0"/>
-              </a:spcBef>
-              <a:spcAft>
-                <a:spcPts val="1000"/>
-              </a:spcAft>
-              <a:buFont typeface="Arial" panose="020B0604020202020204" pitchFamily="34" charset="0"/>
-              <a:buNone/>
-              <a:defRPr sz="1600" u="none" strike="noStrike" kern="1200" cap="none" spc="150" normalizeH="0" baseline="0">
-                <a:solidFill>
-                  <a:schemeClr val="tx1">
-                    <a:tint val="75000"/>
-                  </a:schemeClr>
-                </a:solidFill>
-                <a:uFillTx/>
-                <a:latin typeface="+mn-lt"/>
-                <a:ea typeface="+mn-ea"/>
-                <a:cs typeface="+mn-cs"/>
-              </a:defRPr>
-            </a:lvl4pPr>
-            <a:lvl5pPr marL="1828800" indent="0" algn="l" defTabSz="914400" rtl="0" eaLnBrk="1" fontAlgn="auto" latinLnBrk="0" hangingPunct="1">
-              <a:lnSpc>
-                <a:spcPct val="130000"/>
-              </a:lnSpc>
-              <a:spcBef>
-                <a:spcPts val="0"/>
-              </a:spcBef>
-              <a:spcAft>
-                <a:spcPts val="1000"/>
-              </a:spcAft>
-              <a:buFont typeface="Arial" panose="020B0604020202020204" pitchFamily="34" charset="0"/>
-              <a:buNone/>
-              <a:defRPr sz="1600" u="none" strike="noStrike" kern="1200" cap="none" spc="150" normalizeH="0" baseline="0">
-                <a:solidFill>
-                  <a:schemeClr val="tx1">
-                    <a:tint val="75000"/>
-                  </a:schemeClr>
-                </a:solidFill>
-                <a:uFillTx/>
-                <a:latin typeface="+mn-lt"/>
-                <a:ea typeface="+mn-ea"/>
-                <a:cs typeface="+mn-cs"/>
-              </a:defRPr>
-            </a:lvl5pPr>
-            <a:lvl6pPr marL="2286000" indent="0" algn="l" defTabSz="914400" rtl="0" eaLnBrk="1" latinLnBrk="0" hangingPunct="1">
-              <a:lnSpc>
-                <a:spcPct val="90000"/>
-              </a:lnSpc>
-              <a:spcBef>
-                <a:spcPts val="500"/>
-              </a:spcBef>
-              <a:buFont typeface="Arial" panose="020B0604020202020204" pitchFamily="34" charset="0"/>
-              <a:buNone/>
-              <a:defRPr sz="1600" kern="1200">
-                <a:solidFill>
-                  <a:schemeClr val="tx1">
-                    <a:tint val="75000"/>
-                  </a:schemeClr>
-                </a:solidFill>
-                <a:latin typeface="+mn-lt"/>
-                <a:ea typeface="+mn-ea"/>
-                <a:cs typeface="+mn-cs"/>
-              </a:defRPr>
-            </a:lvl6pPr>
-            <a:lvl7pPr marL="2743200" indent="0" algn="l" defTabSz="914400" rtl="0" eaLnBrk="1" latinLnBrk="0" hangingPunct="1">
-              <a:lnSpc>
-                <a:spcPct val="90000"/>
-              </a:lnSpc>
-              <a:spcBef>
-                <a:spcPts val="500"/>
-              </a:spcBef>
-              <a:buFont typeface="Arial" panose="020B0604020202020204" pitchFamily="34" charset="0"/>
-              <a:buNone/>
-              <a:defRPr sz="1600" kern="1200">
-                <a:solidFill>
-                  <a:schemeClr val="tx1">
-                    <a:tint val="75000"/>
-                  </a:schemeClr>
-                </a:solidFill>
-                <a:latin typeface="+mn-lt"/>
-                <a:ea typeface="+mn-ea"/>
-                <a:cs typeface="+mn-cs"/>
-              </a:defRPr>
-            </a:lvl7pPr>
-            <a:lvl8pPr marL="3200400" indent="0" algn="l" defTabSz="914400" rtl="0" eaLnBrk="1" latinLnBrk="0" hangingPunct="1">
-              <a:lnSpc>
-                <a:spcPct val="90000"/>
-              </a:lnSpc>
-              <a:spcBef>
-                <a:spcPts val="500"/>
-              </a:spcBef>
-              <a:buFont typeface="Arial" panose="020B0604020202020204" pitchFamily="34" charset="0"/>
-              <a:buNone/>
-              <a:defRPr sz="1600" kern="1200">
-                <a:solidFill>
-                  <a:schemeClr val="tx1">
-                    <a:tint val="75000"/>
-                  </a:schemeClr>
-                </a:solidFill>
-                <a:latin typeface="+mn-lt"/>
-                <a:ea typeface="+mn-ea"/>
-                <a:cs typeface="+mn-cs"/>
-              </a:defRPr>
-            </a:lvl8pPr>
-            <a:lvl9pPr marL="3657600" indent="0" algn="l" defTabSz="914400" rtl="0" eaLnBrk="1" latinLnBrk="0" hangingPunct="1">
-              <a:lnSpc>
-                <a:spcPct val="90000"/>
-              </a:lnSpc>
-              <a:spcBef>
-                <a:spcPts val="500"/>
-              </a:spcBef>
-              <a:buFont typeface="Arial" panose="020B0604020202020204" pitchFamily="34" charset="0"/>
-              <a:buNone/>
-              <a:defRPr sz="1600" kern="1200">
-                <a:solidFill>
-                  <a:schemeClr val="tx1">
-                    <a:tint val="75000"/>
-                  </a:schemeClr>
-                </a:solidFill>
-                <a:latin typeface="+mn-lt"/>
-                <a:ea typeface="+mn-ea"/>
-                <a:cs typeface="+mn-cs"/>
-              </a:defRPr>
-            </a:lvl9pPr>
-          </a:lstStyle>
-          <a:p>
-            <a:pPr marL="285750" indent="-285750">
-              <a:buFont typeface="Arial" panose="020B0604020202020204" pitchFamily="34" charset="0"/>
-              <a:buChar char="•"/>
-            </a:pPr>
-            <a:r>
-              <a:rPr lang="zh-CN" altLang="en-US" dirty="0"/>
-              <a:t>能否提出一个折中的方法？</a:t>
-            </a:r>
-            <a:endParaRPr lang="en-US" altLang="zh-CN" dirty="0"/>
-          </a:p>
-          <a:p>
-            <a:pPr marL="285750" indent="-285750">
-              <a:buFont typeface="Arial" panose="020B0604020202020204" pitchFamily="34" charset="0"/>
-              <a:buChar char="•"/>
-            </a:pPr>
-            <a:r>
-              <a:rPr lang="zh-CN" altLang="en-US" dirty="0"/>
-              <a:t>该方法有什么优势？</a:t>
-            </a:r>
-            <a:endParaRPr lang="en-US" altLang="zh-CN" dirty="0"/>
-          </a:p>
-          <a:p>
-            <a:pPr marL="285750" indent="-285750">
-              <a:buFont typeface="Arial" panose="020B0604020202020204" pitchFamily="34" charset="0"/>
-              <a:buChar char="•"/>
-            </a:pPr>
-            <a:endParaRPr lang="en-US" altLang="zh-CN" dirty="0"/>
-          </a:p>
-          <a:p>
-            <a:endParaRPr lang="en-US" altLang="zh-CN" dirty="0"/>
-          </a:p>
-          <a:p>
-            <a:pPr marL="285750" indent="-285750">
-              <a:buFont typeface="Arial" panose="020B0604020202020204" pitchFamily="34" charset="0"/>
-              <a:buChar char="•"/>
-            </a:pPr>
-            <a:r>
-              <a:rPr lang="zh-CN" altLang="en-US" dirty="0"/>
-              <a:t>自学、互学、展学</a:t>
-            </a:r>
-          </a:p>
-          <a:p>
-            <a:pPr marL="285750" indent="-285750">
-              <a:buFont typeface="Arial" panose="020B0604020202020204" pitchFamily="34" charset="0"/>
-              <a:buChar char="•"/>
-            </a:pPr>
-            <a:endParaRPr lang="zh-CN" altLang="en-US" dirty="0"/>
-          </a:p>
-          <a:p>
-            <a:pPr marL="285750" indent="-285750">
-              <a:buFont typeface="Arial" panose="020B0604020202020204" pitchFamily="34" charset="0"/>
-              <a:buChar char="•"/>
-            </a:pPr>
-            <a:endParaRPr lang="en-US" altLang="zh-CN" dirty="0"/>
-          </a:p>
-          <a:p>
-            <a:pPr marL="285750" indent="-285750">
-              <a:buFont typeface="Arial" panose="020B0604020202020204" pitchFamily="34" charset="0"/>
-              <a:buChar char="•"/>
-            </a:pPr>
-            <a:endParaRPr lang="zh-CN" altLang="en-US" dirty="0"/>
-          </a:p>
-          <a:p>
-            <a:pPr marL="285750" indent="-285750">
-              <a:buFont typeface="Arial" panose="020B0604020202020204" pitchFamily="34" charset="0"/>
-              <a:buChar char="•"/>
-            </a:pPr>
-            <a:endParaRPr lang="zh-CN" altLang="en-US" dirty="0"/>
-          </a:p>
-          <a:p>
-            <a:pPr marL="285750" indent="-285750">
-              <a:buFont typeface="Arial" panose="020B0604020202020204" pitchFamily="34" charset="0"/>
-              <a:buChar char="•"/>
-            </a:pPr>
-            <a:endParaRPr lang="zh-CN" altLang="en-US" dirty="0"/>
-          </a:p>
-          <a:p>
-            <a:pPr marL="285750" indent="-285750">
-              <a:buFont typeface="Arial" panose="020B0604020202020204" pitchFamily="34" charset="0"/>
-              <a:buChar char="•"/>
-            </a:pPr>
-            <a:endParaRPr lang="zh-CN" altLang="en-US" dirty="0"/>
-          </a:p>
-          <a:p>
-            <a:pPr marL="285750" indent="-285750">
-              <a:buFont typeface="Arial" panose="020B0604020202020204" pitchFamily="34" charset="0"/>
-              <a:buChar char="•"/>
-            </a:pPr>
-            <a:endParaRPr lang="zh-CN" altLang="en-US" dirty="0"/>
-          </a:p>
-          <a:p>
-            <a:pPr marL="285750" indent="-285750">
-              <a:buFont typeface="Arial" panose="020B0604020202020204" pitchFamily="34" charset="0"/>
-              <a:buChar char="•"/>
-            </a:pPr>
-            <a:endParaRPr lang="zh-CN" altLang="en-US" dirty="0"/>
-          </a:p>
-          <a:p>
-            <a:pPr marL="285750" indent="-285750">
-              <a:buFont typeface="Arial" panose="020B0604020202020204" pitchFamily="34" charset="0"/>
-              <a:buChar char="•"/>
-            </a:pPr>
-            <a:endParaRPr lang="zh-CN" altLang="en-US" dirty="0"/>
-          </a:p>
-        </p:txBody>
-      </p:sp>
-    </p:spTree>
-    <p:custDataLst>
-      <p:tags r:id="rId1"/>
-    </p:custDataLst>
-    <p:extLst>
-      <p:ext uri="{BB962C8B-B14F-4D97-AF65-F5344CB8AC3E}">
-        <p14:creationId xmlns:p14="http://schemas.microsoft.com/office/powerpoint/2010/main" val="906653231"/>
-      </p:ext>
-    </p:extLst>
-  </p:cSld>
-  <p:clrMapOvr>
-    <a:masterClrMapping/>
-  </p:clrMapOvr>
-  <p:timing>
-    <p:tnLst>
-      <p:par>
-        <p:cTn id="1" dur="indefinite" restart="never" nodeType="tmRoot">
-          <p:childTnLst>
-            <p:seq concurrent="1" nextAc="seek">
-              <p:cTn id="2" dur="indefinite" nodeType="mainSeq">
-                <p:childTnLst>
-                  <p:par>
-                    <p:cTn id="3" fill="hold">
-                      <p:stCondLst>
-                        <p:cond delay="indefinite"/>
-                      </p:stCondLst>
-                      <p:childTnLst>
-                        <p:par>
-                          <p:cTn id="4" fill="hold">
-                            <p:stCondLst>
-                              <p:cond delay="0"/>
-                            </p:stCondLst>
-                            <p:childTnLst>
-                              <p:par>
-                                <p:cTn id="5" presetID="1" presetClass="entr" presetSubtype="0" fill="hold" grpId="0" nodeType="clickEffect">
-                                  <p:stCondLst>
-                                    <p:cond delay="0"/>
-                                  </p:stCondLst>
-                                  <p:childTnLst>
-                                    <p:set>
-                                      <p:cBhvr>
-                                        <p:cTn id="6" dur="1" fill="hold">
-                                          <p:stCondLst>
-                                            <p:cond delay="0"/>
-                                          </p:stCondLst>
-                                        </p:cTn>
-                                        <p:tgtEl>
-                                          <p:spTgt spid="6"/>
-                                        </p:tgtEl>
-                                        <p:attrNameLst>
-                                          <p:attrName>style.visibility</p:attrName>
-                                        </p:attrNameLst>
-                                      </p:cBhvr>
-                                      <p:to>
-                                        <p:strVal val="visible"/>
-                                      </p:to>
-                                    </p:set>
-                                  </p:childTnLst>
-                                </p:cTn>
-                              </p:par>
-                            </p:childTnLst>
-                          </p:cTn>
-                        </p:par>
-                      </p:childTnLst>
-                    </p:cTn>
-                  </p:par>
-                </p:childTnLst>
-              </p:cTn>
-              <p:prevCondLst>
-                <p:cond evt="onPrev" delay="0">
-                  <p:tgtEl>
-                    <p:sldTgt/>
-                  </p:tgtEl>
-                </p:cond>
-              </p:prevCondLst>
-              <p:nextCondLst>
-                <p:cond evt="onNext" delay="0">
-                  <p:tgtEl>
-                    <p:sldTgt/>
-                  </p:tgtEl>
-                </p:cond>
-              </p:nextCondLst>
-            </p:seq>
-          </p:childTnLst>
-        </p:cTn>
-      </p:par>
-    </p:tnLst>
-    <p:bldLst>
-      <p:bldP spid="6" grpId="0"/>
+      <p:bldP spid="2" grpId="0"/>
     </p:bldLst>
   </p:timing>
 </p:sld>

</xml_diff>